<commit_message>
add numbers to last confusing slide
</commit_message>
<xml_diff>
--- a/Slides/Lesson 4.1 Concurrent Programming.pptx
+++ b/Slides/Lesson 4.1 Concurrent Programming.pptx
@@ -25282,7 +25282,7 @@
                   <a:srgbClr val="008000"/>
                 </a:solidFill>
               </a:rPr>
-              <a:t>'Making Request'</a:t>
+              <a:t>'1. Making Request'</a:t>
             </a:r>
             <a:r>
               <a:rPr lang="en-US" sz="1600" dirty="0"/>
@@ -25412,7 +25412,7 @@
                   <a:srgbClr val="008000"/>
                 </a:solidFill>
               </a:rPr>
-              <a:t>'Heard back from server'</a:t>
+              <a:t>'2. Heard back from server'</a:t>
             </a:r>
             <a:r>
               <a:rPr lang="en-US" sz="1600" dirty="0"/>
@@ -25527,7 +25527,7 @@
                   <a:srgbClr val="008000"/>
                 </a:solidFill>
               </a:rPr>
-              <a:t>'All done!'</a:t>
+              <a:t>'3. All done!'</a:t>
             </a:r>
             <a:r>
               <a:rPr lang="en-US" sz="1600" dirty="0"/>
@@ -25954,7 +25954,7 @@
               </a:pPr>
               <a:r>
                 <a:rPr lang="en-US" sz="1700" dirty="0"/>
-                <a:t>Making Request</a:t>
+                <a:t>1. Making Request</a:t>
               </a:r>
             </a:p>
             <a:p>
@@ -25971,7 +25971,7 @@
               </a:pPr>
               <a:r>
                 <a:rPr lang="en-US" sz="1700" dirty="0"/>
-                <a:t>All done!</a:t>
+                <a:t>3. All done!</a:t>
               </a:r>
               <a:endParaRPr sz="1700" dirty="0"/>
             </a:p>
@@ -25987,6 +25987,10 @@
                   <a:sym typeface="Menlo Regular"/>
                 </a:defRPr>
               </a:pPr>
+              <a:r>
+                <a:rPr lang="en-US" sz="1700" dirty="0"/>
+                <a:t>2. </a:t>
+              </a:r>
               <a:r>
                 <a:rPr sz="1700" dirty="0"/>
                 <a:t>Heard back from server</a:t>

</xml_diff>

<commit_message>
finalize 4.1, add 4.2, add activity for async to go with 4.2
</commit_message>
<xml_diff>
--- a/Slides/Lesson 4.1 Concurrent Programming.pptx
+++ b/Slides/Lesson 4.1 Concurrent Programming.pptx
@@ -1749,13 +1749,8 @@
           <a:p>
             <a:r>
               <a:rPr lang="en-US" dirty="0"/>
-              <a:t>As we’ll see in the next few lessons, despite this run-to-completion semantics, async programming can still be very confusing. What happens if we do NOT await an </a:t>
-            </a:r>
-            <a:r>
-              <a:rPr lang="en-US"/>
-              <a:t>async function?</a:t>
-            </a:r>
-            <a:endParaRPr lang="en-US" dirty="0"/>
+              <a:t>As we’ll see in the next few lessons, despite this run-to-completion semantics, async programming can still be very confusing. What happens if we do NOT await an async function?</a:t>
+            </a:r>
           </a:p>
           <a:p>
             <a:endParaRPr lang="en-US" dirty="0"/>

</xml_diff>

<commit_message>
update 4.1 notes on run to completion
</commit_message>
<xml_diff>
--- a/Slides/Lesson 4.1 Concurrent Programming.pptx
+++ b/Slides/Lesson 4.1 Concurrent Programming.pptx
@@ -333,6 +333,11 @@
       </a:defRPr>
     </a:lvl9pPr>
   </p:defaultTextStyle>
+  <p:extLst>
+    <p:ext uri="{EFAFB233-063F-42B5-8137-9DF3F51BA10A}">
+      <p15:sldGuideLst xmlns:p15="http://schemas.microsoft.com/office/powerpoint/2012/main"/>
+    </p:ext>
+  </p:extLst>
 </p:presentation>
 </file>
 
@@ -1822,14 +1827,39 @@
           <a:p>
             <a:r>
               <a:rPr lang="en-US" dirty="0"/>
-              <a:t>Is this a violation of run to completion?</a:t>
+              <a:t>Interesting question - Is this a violation of run to completion? </a:t>
             </a:r>
           </a:p>
           <a:p>
             <a:r>
               <a:rPr lang="en-US" dirty="0"/>
-              <a:t>No, it’s a horribly confusing language design choice. But that’s a topic for another course. What is important to understand is when you write “await” you are saying “let other things keep going, but don’t keep running the code in this method” – this is how we get asynchronous stuff, so that’s good! We’ll revisit this behavior in more examples in the next lesson.</a:t>
-            </a:r>
+              <a:t>(This is a judgement call, think about it)</a:t>
+            </a:r>
+          </a:p>
+          <a:p>
+            <a:pPr marL="171450" indent="-171450">
+              <a:buFont typeface="Arial" panose="020B0604020202020204" pitchFamily="34" charset="0"/>
+              <a:buChar char="•"/>
+            </a:pPr>
+            <a:r>
+              <a:rPr lang="en-US" dirty="0"/>
+              <a:t>One argument: No, it’s a horribly confusing language design choice. “Await” means “return”, and then later on come back to this line of code. Seems confusing, but maybe there is no better way? Or maybe there is… But that’s a topic for another course. What is important to understand is when you write “await” you are saying “let other things keep going, but don’t keep running the code in this method” – this is how we get asynchronous stuff, so that’s good! We’ll revisit this behavior in more examples in the next lesson.</a:t>
+            </a:r>
+          </a:p>
+          <a:p>
+            <a:pPr marL="171450" indent="-171450">
+              <a:buFont typeface="Arial" panose="020B0604020202020204" pitchFamily="34" charset="0"/>
+              <a:buChar char="•"/>
+            </a:pPr>
+            <a:r>
+              <a:rPr lang="en-US" dirty="0"/>
+              <a:t>Another argument: No, it’s still run to completion: you have just signaled that you have ”completed” until you get your promise fulfilled (</a:t>
+            </a:r>
+            <a:r>
+              <a:rPr lang="en-US"/>
+              <a:t>or rejected).</a:t>
+            </a:r>
+            <a:endParaRPr lang="en-US" dirty="0"/>
           </a:p>
         </p:txBody>
       </p:sp>
@@ -3320,7 +3350,7 @@
           <a:p>
             <a:fld id="{5D2A64DE-480B-420F-9649-4F8E696E08E0}" type="datetime1">
               <a:rPr lang="en-US" smtClean="0"/>
-              <a:t>2/1/22</a:t>
+              <a:t>2/3/22</a:t>
             </a:fld>
             <a:endParaRPr lang="en-US"/>
           </a:p>
@@ -3574,7 +3604,7 @@
           <a:p>
             <a:fld id="{07C7BFD4-467E-4EDE-93EA-052F5B39A4E5}" type="datetime1">
               <a:rPr lang="en-US" smtClean="0"/>
-              <a:t>2/1/22</a:t>
+              <a:t>2/3/22</a:t>
             </a:fld>
             <a:endParaRPr lang="en-US"/>
           </a:p>
@@ -5751,7 +5781,7 @@
           <a:p>
             <a:fld id="{07C7BFD4-467E-4EDE-93EA-052F5B39A4E5}" type="datetime1">
               <a:rPr lang="en-US" smtClean="0"/>
-              <a:t>2/1/22</a:t>
+              <a:t>2/3/22</a:t>
             </a:fld>
             <a:endParaRPr lang="en-US"/>
           </a:p>
@@ -8247,7 +8277,7 @@
           <a:p>
             <a:fld id="{5D2A64DE-480B-420F-9649-4F8E696E08E0}" type="datetime1">
               <a:rPr lang="en-US" smtClean="0"/>
-              <a:t>2/1/22</a:t>
+              <a:t>2/3/22</a:t>
             </a:fld>
             <a:endParaRPr lang="en-US"/>
           </a:p>
@@ -8501,7 +8531,7 @@
           <a:p>
             <a:fld id="{07C7BFD4-467E-4EDE-93EA-052F5B39A4E5}" type="datetime1">
               <a:rPr lang="en-US" smtClean="0"/>
-              <a:t>2/1/22</a:t>
+              <a:t>2/3/22</a:t>
             </a:fld>
             <a:endParaRPr lang="en-US"/>
           </a:p>
@@ -10752,7 +10782,7 @@
           <a:p>
             <a:fld id="{07C7BFD4-467E-4EDE-93EA-052F5B39A4E5}" type="datetime1">
               <a:rPr lang="en-US" smtClean="0"/>
-              <a:t>2/1/22</a:t>
+              <a:t>2/3/22</a:t>
             </a:fld>
             <a:endParaRPr lang="en-US"/>
           </a:p>
@@ -11544,7 +11574,7 @@
           </a:ln>
           <a:extLst>
             <a:ext uri="{C572A759-6A51-4108-AA02-DFA0A04FC94B}">
-              <ma14:wrappingTextBoxFlag xmlns:ma14="http://schemas.microsoft.com/office/mac/drawingml/2011/main" xmlns:a14="http://schemas.microsoft.com/office/drawing/2010/main" xmlns:m="http://schemas.openxmlformats.org/officeDocument/2006/math" xmlns="" val="1"/>
+              <ma14:wrappingTextBoxFlag xmlns="" xmlns:m="http://schemas.openxmlformats.org/officeDocument/2006/math" xmlns:a14="http://schemas.microsoft.com/office/drawing/2010/main" xmlns:ma14="http://schemas.microsoft.com/office/mac/drawingml/2011/main" val="1"/>
             </a:ext>
           </a:extLst>
         </p:spPr>
@@ -11584,7 +11614,7 @@
           </a:ln>
           <a:extLst>
             <a:ext uri="{C572A759-6A51-4108-AA02-DFA0A04FC94B}">
-              <ma14:wrappingTextBoxFlag xmlns:ma14="http://schemas.microsoft.com/office/mac/drawingml/2011/main" xmlns:a14="http://schemas.microsoft.com/office/drawing/2010/main" xmlns:m="http://schemas.openxmlformats.org/officeDocument/2006/math" xmlns="" val="1"/>
+              <ma14:wrappingTextBoxFlag xmlns="" xmlns:m="http://schemas.openxmlformats.org/officeDocument/2006/math" xmlns:a14="http://schemas.microsoft.com/office/drawing/2010/main" xmlns:ma14="http://schemas.microsoft.com/office/mac/drawingml/2011/main" val="1"/>
             </a:ext>
           </a:extLst>
         </p:spPr>
@@ -12451,7 +12481,7 @@
           </a:ln>
           <a:extLst>
             <a:ext uri="{C572A759-6A51-4108-AA02-DFA0A04FC94B}">
-              <ma14:wrappingTextBoxFlag xmlns="" xmlns:m="http://schemas.openxmlformats.org/officeDocument/2006/math" xmlns:a14="http://schemas.microsoft.com/office/drawing/2010/main" xmlns:ma14="http://schemas.microsoft.com/office/mac/drawingml/2011/main" val="1"/>
+              <ma14:wrappingTextBoxFlag xmlns:ma14="http://schemas.microsoft.com/office/mac/drawingml/2011/main" xmlns:a14="http://schemas.microsoft.com/office/drawing/2010/main" xmlns:m="http://schemas.openxmlformats.org/officeDocument/2006/math" xmlns="" val="1"/>
             </a:ext>
           </a:extLst>
         </p:spPr>
@@ -12491,7 +12521,7 @@
           </a:ln>
           <a:extLst>
             <a:ext uri="{C572A759-6A51-4108-AA02-DFA0A04FC94B}">
-              <ma14:wrappingTextBoxFlag xmlns="" xmlns:m="http://schemas.openxmlformats.org/officeDocument/2006/math" xmlns:a14="http://schemas.microsoft.com/office/drawing/2010/main" xmlns:ma14="http://schemas.microsoft.com/office/mac/drawingml/2011/main" val="1"/>
+              <ma14:wrappingTextBoxFlag xmlns:ma14="http://schemas.microsoft.com/office/mac/drawingml/2011/main" xmlns:a14="http://schemas.microsoft.com/office/drawing/2010/main" xmlns:m="http://schemas.openxmlformats.org/officeDocument/2006/math" xmlns="" val="1"/>
             </a:ext>
           </a:extLst>
         </p:spPr>
@@ -13618,7 +13648,7 @@
           </a:ln>
           <a:extLst>
             <a:ext uri="{C572A759-6A51-4108-AA02-DFA0A04FC94B}">
-              <ma14:wrappingTextBoxFlag xmlns="" xmlns:m="http://schemas.openxmlformats.org/officeDocument/2006/math" xmlns:a14="http://schemas.microsoft.com/office/drawing/2010/main" xmlns:ma14="http://schemas.microsoft.com/office/mac/drawingml/2011/main" val="1"/>
+              <ma14:wrappingTextBoxFlag xmlns:ma14="http://schemas.microsoft.com/office/mac/drawingml/2011/main" xmlns:a14="http://schemas.microsoft.com/office/drawing/2010/main" xmlns:m="http://schemas.openxmlformats.org/officeDocument/2006/math" xmlns="" val="1"/>
             </a:ext>
           </a:extLst>
         </p:spPr>
@@ -13918,7 +13948,7 @@
             </a:ln>
             <a:extLst>
               <a:ext uri="{C572A759-6A51-4108-AA02-DFA0A04FC94B}">
-                <ma14:wrappingTextBoxFlag xmlns:ma14="http://schemas.microsoft.com/office/mac/drawingml/2011/main" xmlns:a14="http://schemas.microsoft.com/office/drawing/2010/main" xmlns:m="http://schemas.openxmlformats.org/officeDocument/2006/math" xmlns="" val="1"/>
+                <ma14:wrappingTextBoxFlag xmlns="" xmlns:m="http://schemas.openxmlformats.org/officeDocument/2006/math" xmlns:a14="http://schemas.microsoft.com/office/drawing/2010/main" xmlns:ma14="http://schemas.microsoft.com/office/mac/drawingml/2011/main" val="1"/>
               </a:ext>
             </a:extLst>
           </p:spPr>
@@ -14337,11 +14367,11 @@
   <p:clrMapOvr>
     <a:masterClrMapping/>
   </p:clrMapOvr>
-  <mc:AlternateContent xmlns:mc="http://schemas.openxmlformats.org/markup-compatibility/2006">
-    <mc:Choice xmlns:p14="http://schemas.microsoft.com/office/powerpoint/2010/main" Requires="p14">
+  <mc:AlternateContent xmlns:mc="http://schemas.openxmlformats.org/markup-compatibility/2006" xmlns:p14="http://schemas.microsoft.com/office/powerpoint/2010/main">
+    <mc:Choice Requires="p14">
       <p:transition p14:dur="0"/>
     </mc:Choice>
-    <mc:Fallback>
+    <mc:Fallback xmlns="">
       <p:transition/>
     </mc:Fallback>
   </mc:AlternateContent>
@@ -14495,7 +14525,7 @@
           </a:ln>
           <a:extLst>
             <a:ext uri="{C572A759-6A51-4108-AA02-DFA0A04FC94B}">
-              <ma14:wrappingTextBoxFlag xmlns="" xmlns:m="http://schemas.openxmlformats.org/officeDocument/2006/math" xmlns:a14="http://schemas.microsoft.com/office/drawing/2010/main" xmlns:ma14="http://schemas.microsoft.com/office/mac/drawingml/2011/main" val="1"/>
+              <ma14:wrappingTextBoxFlag xmlns:ma14="http://schemas.microsoft.com/office/mac/drawingml/2011/main" xmlns:a14="http://schemas.microsoft.com/office/drawing/2010/main" xmlns:m="http://schemas.openxmlformats.org/officeDocument/2006/math" xmlns="" val="1"/>
             </a:ext>
           </a:extLst>
         </p:spPr>
@@ -14790,7 +14820,7 @@
           </a:prstGeom>
           <a:extLst>
             <a:ext uri="{C572A759-6A51-4108-AA02-DFA0A04FC94B}">
-              <ma14:wrappingTextBoxFlag xmlns:ma14="http://schemas.microsoft.com/office/mac/drawingml/2011/main" xmlns:a14="http://schemas.microsoft.com/office/drawing/2010/main" xmlns:m="http://schemas.openxmlformats.org/officeDocument/2006/math" xmlns="" val="1"/>
+              <ma14:wrappingTextBoxFlag xmlns="" xmlns:m="http://schemas.openxmlformats.org/officeDocument/2006/math" xmlns:a14="http://schemas.microsoft.com/office/drawing/2010/main" xmlns:ma14="http://schemas.microsoft.com/office/mac/drawingml/2011/main" val="1"/>
             </a:ext>
           </a:extLst>
         </p:spPr>
@@ -14847,7 +14877,7 @@
             </a:ln>
             <a:extLst>
               <a:ext uri="{C572A759-6A51-4108-AA02-DFA0A04FC94B}">
-                <ma14:wrappingTextBoxFlag xmlns:ma14="http://schemas.microsoft.com/office/mac/drawingml/2011/main" xmlns:a14="http://schemas.microsoft.com/office/drawing/2010/main" xmlns:m="http://schemas.openxmlformats.org/officeDocument/2006/math" xmlns="" val="1"/>
+                <ma14:wrappingTextBoxFlag xmlns="" xmlns:m="http://schemas.openxmlformats.org/officeDocument/2006/math" xmlns:a14="http://schemas.microsoft.com/office/drawing/2010/main" xmlns:ma14="http://schemas.microsoft.com/office/mac/drawingml/2011/main" val="1"/>
               </a:ext>
             </a:extLst>
           </p:spPr>
@@ -15111,7 +15141,7 @@
             <a:effectLst/>
             <a:extLst>
               <a:ext uri="{C572A759-6A51-4108-AA02-DFA0A04FC94B}">
-                <ma14:wrappingTextBoxFlag xmlns:ma14="http://schemas.microsoft.com/office/mac/drawingml/2011/main" xmlns:a14="http://schemas.microsoft.com/office/drawing/2010/main" xmlns:m="http://schemas.openxmlformats.org/officeDocument/2006/math" xmlns="" val="1"/>
+                <ma14:wrappingTextBoxFlag xmlns="" xmlns:m="http://schemas.openxmlformats.org/officeDocument/2006/math" xmlns:a14="http://schemas.microsoft.com/office/drawing/2010/main" xmlns:ma14="http://schemas.microsoft.com/office/mac/drawingml/2011/main" val="1"/>
               </a:ext>
             </a:extLst>
           </p:spPr>
@@ -15212,7 +15242,7 @@
             <a:effectLst/>
             <a:extLst>
               <a:ext uri="{C572A759-6A51-4108-AA02-DFA0A04FC94B}">
-                <ma14:wrappingTextBoxFlag xmlns:ma14="http://schemas.microsoft.com/office/mac/drawingml/2011/main" xmlns:a14="http://schemas.microsoft.com/office/drawing/2010/main" xmlns:m="http://schemas.openxmlformats.org/officeDocument/2006/math" xmlns="" val="1"/>
+                <ma14:wrappingTextBoxFlag xmlns="" xmlns:m="http://schemas.openxmlformats.org/officeDocument/2006/math" xmlns:a14="http://schemas.microsoft.com/office/drawing/2010/main" xmlns:ma14="http://schemas.microsoft.com/office/mac/drawingml/2011/main" val="1"/>
               </a:ext>
             </a:extLst>
           </p:spPr>
@@ -15249,11 +15279,11 @@
   <p:clrMapOvr>
     <a:masterClrMapping/>
   </p:clrMapOvr>
-  <mc:AlternateContent xmlns:mc="http://schemas.openxmlformats.org/markup-compatibility/2006">
-    <mc:Choice xmlns:p14="http://schemas.microsoft.com/office/powerpoint/2010/main" Requires="p14">
+  <mc:AlternateContent xmlns:mc="http://schemas.openxmlformats.org/markup-compatibility/2006" xmlns:p14="http://schemas.microsoft.com/office/powerpoint/2010/main">
+    <mc:Choice Requires="p14">
       <p:transition p14:dur="0"/>
     </mc:Choice>
-    <mc:Fallback>
+    <mc:Fallback xmlns="">
       <p:transition/>
     </mc:Fallback>
   </mc:AlternateContent>
@@ -15380,7 +15410,7 @@
           </a:ln>
           <a:extLst>
             <a:ext uri="{C572A759-6A51-4108-AA02-DFA0A04FC94B}">
-              <ma14:wrappingTextBoxFlag xmlns="" xmlns:m="http://schemas.openxmlformats.org/officeDocument/2006/math" xmlns:a14="http://schemas.microsoft.com/office/drawing/2010/main" xmlns:ma14="http://schemas.microsoft.com/office/mac/drawingml/2011/main" val="1"/>
+              <ma14:wrappingTextBoxFlag xmlns:ma14="http://schemas.microsoft.com/office/mac/drawingml/2011/main" xmlns:a14="http://schemas.microsoft.com/office/drawing/2010/main" xmlns:m="http://schemas.openxmlformats.org/officeDocument/2006/math" xmlns="" val="1"/>
             </a:ext>
           </a:extLst>
         </p:spPr>
@@ -15576,7 +15606,7 @@
           </a:prstGeom>
           <a:extLst>
             <a:ext uri="{C572A759-6A51-4108-AA02-DFA0A04FC94B}">
-              <ma14:wrappingTextBoxFlag xmlns:ma14="http://schemas.microsoft.com/office/mac/drawingml/2011/main" xmlns:a14="http://schemas.microsoft.com/office/drawing/2010/main" xmlns:m="http://schemas.openxmlformats.org/officeDocument/2006/math" xmlns="" val="1"/>
+              <ma14:wrappingTextBoxFlag xmlns="" xmlns:m="http://schemas.openxmlformats.org/officeDocument/2006/math" xmlns:a14="http://schemas.microsoft.com/office/drawing/2010/main" xmlns:ma14="http://schemas.microsoft.com/office/mac/drawingml/2011/main" val="1"/>
             </a:ext>
           </a:extLst>
         </p:spPr>
@@ -15729,7 +15759,7 @@
             <a:effectLst/>
             <a:extLst>
               <a:ext uri="{C572A759-6A51-4108-AA02-DFA0A04FC94B}">
-                <ma14:wrappingTextBoxFlag xmlns:ma14="http://schemas.microsoft.com/office/mac/drawingml/2011/main" xmlns:a14="http://schemas.microsoft.com/office/drawing/2010/main" xmlns:m="http://schemas.openxmlformats.org/officeDocument/2006/math" xmlns="" val="1"/>
+                <ma14:wrappingTextBoxFlag xmlns="" xmlns:m="http://schemas.openxmlformats.org/officeDocument/2006/math" xmlns:a14="http://schemas.microsoft.com/office/drawing/2010/main" xmlns:ma14="http://schemas.microsoft.com/office/mac/drawingml/2011/main" val="1"/>
               </a:ext>
             </a:extLst>
           </p:spPr>
@@ -15924,7 +15954,7 @@
             <a:effectLst/>
             <a:extLst>
               <a:ext uri="{C572A759-6A51-4108-AA02-DFA0A04FC94B}">
-                <ma14:wrappingTextBoxFlag xmlns:ma14="http://schemas.microsoft.com/office/mac/drawingml/2011/main" xmlns:a14="http://schemas.microsoft.com/office/drawing/2010/main" xmlns:m="http://schemas.openxmlformats.org/officeDocument/2006/math" xmlns="" val="1"/>
+                <ma14:wrappingTextBoxFlag xmlns="" xmlns:m="http://schemas.openxmlformats.org/officeDocument/2006/math" xmlns:a14="http://schemas.microsoft.com/office/drawing/2010/main" xmlns:ma14="http://schemas.microsoft.com/office/mac/drawingml/2011/main" val="1"/>
               </a:ext>
             </a:extLst>
           </p:spPr>
@@ -15961,11 +15991,11 @@
   <p:clrMapOvr>
     <a:masterClrMapping/>
   </p:clrMapOvr>
-  <mc:AlternateContent xmlns:mc="http://schemas.openxmlformats.org/markup-compatibility/2006">
-    <mc:Choice xmlns:p14="http://schemas.microsoft.com/office/powerpoint/2010/main" Requires="p14">
+  <mc:AlternateContent xmlns:mc="http://schemas.openxmlformats.org/markup-compatibility/2006" xmlns:p14="http://schemas.microsoft.com/office/powerpoint/2010/main">
+    <mc:Choice Requires="p14">
       <p:transition p14:dur="0"/>
     </mc:Choice>
-    <mc:Fallback>
+    <mc:Fallback xmlns="">
       <p:transition/>
     </mc:Fallback>
   </mc:AlternateContent>
@@ -16092,7 +16122,7 @@
           </a:ln>
           <a:extLst>
             <a:ext uri="{C572A759-6A51-4108-AA02-DFA0A04FC94B}">
-              <ma14:wrappingTextBoxFlag xmlns="" xmlns:m="http://schemas.openxmlformats.org/officeDocument/2006/math" xmlns:a14="http://schemas.microsoft.com/office/drawing/2010/main" xmlns:ma14="http://schemas.microsoft.com/office/mac/drawingml/2011/main" val="1"/>
+              <ma14:wrappingTextBoxFlag xmlns:ma14="http://schemas.microsoft.com/office/mac/drawingml/2011/main" xmlns:a14="http://schemas.microsoft.com/office/drawing/2010/main" xmlns:m="http://schemas.openxmlformats.org/officeDocument/2006/math" xmlns="" val="1"/>
             </a:ext>
           </a:extLst>
         </p:spPr>
@@ -16338,7 +16368,7 @@
           </a:prstGeom>
           <a:extLst>
             <a:ext uri="{C572A759-6A51-4108-AA02-DFA0A04FC94B}">
-              <ma14:wrappingTextBoxFlag xmlns:ma14="http://schemas.microsoft.com/office/mac/drawingml/2011/main" xmlns:a14="http://schemas.microsoft.com/office/drawing/2010/main" xmlns:m="http://schemas.openxmlformats.org/officeDocument/2006/math" xmlns="" val="1"/>
+              <ma14:wrappingTextBoxFlag xmlns="" xmlns:m="http://schemas.openxmlformats.org/officeDocument/2006/math" xmlns:a14="http://schemas.microsoft.com/office/drawing/2010/main" xmlns:ma14="http://schemas.microsoft.com/office/mac/drawingml/2011/main" val="1"/>
             </a:ext>
           </a:extLst>
         </p:spPr>
@@ -16581,7 +16611,7 @@
             <a:effectLst/>
             <a:extLst>
               <a:ext uri="{C572A759-6A51-4108-AA02-DFA0A04FC94B}">
-                <ma14:wrappingTextBoxFlag xmlns:ma14="http://schemas.microsoft.com/office/mac/drawingml/2011/main" xmlns:a14="http://schemas.microsoft.com/office/drawing/2010/main" xmlns:m="http://schemas.openxmlformats.org/officeDocument/2006/math" xmlns="" val="1"/>
+                <ma14:wrappingTextBoxFlag xmlns="" xmlns:m="http://schemas.openxmlformats.org/officeDocument/2006/math" xmlns:a14="http://schemas.microsoft.com/office/drawing/2010/main" xmlns:ma14="http://schemas.microsoft.com/office/mac/drawingml/2011/main" val="1"/>
               </a:ext>
             </a:extLst>
           </p:spPr>
@@ -16698,7 +16728,7 @@
             <a:effectLst/>
             <a:extLst>
               <a:ext uri="{C572A759-6A51-4108-AA02-DFA0A04FC94B}">
-                <ma14:wrappingTextBoxFlag xmlns:ma14="http://schemas.microsoft.com/office/mac/drawingml/2011/main" xmlns:a14="http://schemas.microsoft.com/office/drawing/2010/main" xmlns:m="http://schemas.openxmlformats.org/officeDocument/2006/math" xmlns="" val="1"/>
+                <ma14:wrappingTextBoxFlag xmlns="" xmlns:m="http://schemas.openxmlformats.org/officeDocument/2006/math" xmlns:a14="http://schemas.microsoft.com/office/drawing/2010/main" xmlns:ma14="http://schemas.microsoft.com/office/mac/drawingml/2011/main" val="1"/>
               </a:ext>
             </a:extLst>
           </p:spPr>
@@ -16735,11 +16765,11 @@
   <p:clrMapOvr>
     <a:masterClrMapping/>
   </p:clrMapOvr>
-  <mc:AlternateContent xmlns:mc="http://schemas.openxmlformats.org/markup-compatibility/2006">
-    <mc:Choice xmlns:p14="http://schemas.microsoft.com/office/powerpoint/2010/main" Requires="p14">
+  <mc:AlternateContent xmlns:mc="http://schemas.openxmlformats.org/markup-compatibility/2006" xmlns:p14="http://schemas.microsoft.com/office/powerpoint/2010/main">
+    <mc:Choice Requires="p14">
       <p:transition p14:dur="0"/>
     </mc:Choice>
-    <mc:Fallback>
+    <mc:Fallback xmlns="">
       <p:transition/>
     </mc:Fallback>
   </mc:AlternateContent>
@@ -16914,7 +16944,7 @@
           </a:ln>
           <a:extLst>
             <a:ext uri="{C572A759-6A51-4108-AA02-DFA0A04FC94B}">
-              <ma14:wrappingTextBoxFlag xmlns="" xmlns:m="http://schemas.openxmlformats.org/officeDocument/2006/math" xmlns:a14="http://schemas.microsoft.com/office/drawing/2010/main" xmlns:ma14="http://schemas.microsoft.com/office/mac/drawingml/2011/main" val="1"/>
+              <ma14:wrappingTextBoxFlag xmlns:ma14="http://schemas.microsoft.com/office/mac/drawingml/2011/main" xmlns:a14="http://schemas.microsoft.com/office/drawing/2010/main" xmlns:m="http://schemas.openxmlformats.org/officeDocument/2006/math" xmlns="" val="1"/>
             </a:ext>
           </a:extLst>
         </p:spPr>
@@ -17164,7 +17194,7 @@
           </a:prstGeom>
           <a:extLst>
             <a:ext uri="{C572A759-6A51-4108-AA02-DFA0A04FC94B}">
-              <ma14:wrappingTextBoxFlag xmlns:ma14="http://schemas.microsoft.com/office/mac/drawingml/2011/main" xmlns:a14="http://schemas.microsoft.com/office/drawing/2010/main" xmlns:m="http://schemas.openxmlformats.org/officeDocument/2006/math" xmlns="" val="1"/>
+              <ma14:wrappingTextBoxFlag xmlns="" xmlns:m="http://schemas.openxmlformats.org/officeDocument/2006/math" xmlns:a14="http://schemas.microsoft.com/office/drawing/2010/main" xmlns:ma14="http://schemas.microsoft.com/office/mac/drawingml/2011/main" val="1"/>
             </a:ext>
           </a:extLst>
         </p:spPr>
@@ -17340,7 +17370,7 @@
             <a:effectLst/>
             <a:extLst>
               <a:ext uri="{C572A759-6A51-4108-AA02-DFA0A04FC94B}">
-                <ma14:wrappingTextBoxFlag xmlns:ma14="http://schemas.microsoft.com/office/mac/drawingml/2011/main" xmlns:a14="http://schemas.microsoft.com/office/drawing/2010/main" xmlns:m="http://schemas.openxmlformats.org/officeDocument/2006/math" xmlns="" val="1"/>
+                <ma14:wrappingTextBoxFlag xmlns="" xmlns:m="http://schemas.openxmlformats.org/officeDocument/2006/math" xmlns:a14="http://schemas.microsoft.com/office/drawing/2010/main" xmlns:ma14="http://schemas.microsoft.com/office/mac/drawingml/2011/main" val="1"/>
               </a:ext>
             </a:extLst>
           </p:spPr>
@@ -17457,7 +17487,7 @@
             <a:effectLst/>
             <a:extLst>
               <a:ext uri="{C572A759-6A51-4108-AA02-DFA0A04FC94B}">
-                <ma14:wrappingTextBoxFlag xmlns:ma14="http://schemas.microsoft.com/office/mac/drawingml/2011/main" xmlns:a14="http://schemas.microsoft.com/office/drawing/2010/main" xmlns:m="http://schemas.openxmlformats.org/officeDocument/2006/math" xmlns="" val="1"/>
+                <ma14:wrappingTextBoxFlag xmlns="" xmlns:m="http://schemas.openxmlformats.org/officeDocument/2006/math" xmlns:a14="http://schemas.microsoft.com/office/drawing/2010/main" xmlns:ma14="http://schemas.microsoft.com/office/mac/drawingml/2011/main" val="1"/>
               </a:ext>
             </a:extLst>
           </p:spPr>
@@ -17512,7 +17542,7 @@
           </a:ln>
           <a:extLst>
             <a:ext uri="{C572A759-6A51-4108-AA02-DFA0A04FC94B}">
-              <ma14:wrappingTextBoxFlag xmlns="" xmlns:m="http://schemas.openxmlformats.org/officeDocument/2006/math" xmlns:a14="http://schemas.microsoft.com/office/drawing/2010/main" xmlns:ma14="http://schemas.microsoft.com/office/mac/drawingml/2011/main" val="1"/>
+              <ma14:wrappingTextBoxFlag xmlns:ma14="http://schemas.microsoft.com/office/mac/drawingml/2011/main" xmlns:a14="http://schemas.microsoft.com/office/drawing/2010/main" xmlns:m="http://schemas.openxmlformats.org/officeDocument/2006/math" xmlns="" val="1"/>
             </a:ext>
           </a:extLst>
         </p:spPr>
@@ -17707,7 +17737,7 @@
             <a:effectLst/>
             <a:extLst>
               <a:ext uri="{C572A759-6A51-4108-AA02-DFA0A04FC94B}">
-                <ma14:wrappingTextBoxFlag xmlns:ma14="http://schemas.microsoft.com/office/mac/drawingml/2011/main" xmlns:a14="http://schemas.microsoft.com/office/drawing/2010/main" xmlns:m="http://schemas.openxmlformats.org/officeDocument/2006/math" xmlns="" val="1"/>
+                <ma14:wrappingTextBoxFlag xmlns="" xmlns:m="http://schemas.openxmlformats.org/officeDocument/2006/math" xmlns:a14="http://schemas.microsoft.com/office/drawing/2010/main" xmlns:ma14="http://schemas.microsoft.com/office/mac/drawingml/2011/main" val="1"/>
               </a:ext>
             </a:extLst>
           </p:spPr>
@@ -17902,7 +17932,7 @@
             <a:effectLst/>
             <a:extLst>
               <a:ext uri="{C572A759-6A51-4108-AA02-DFA0A04FC94B}">
-                <ma14:wrappingTextBoxFlag xmlns:ma14="http://schemas.microsoft.com/office/mac/drawingml/2011/main" xmlns:a14="http://schemas.microsoft.com/office/drawing/2010/main" xmlns:m="http://schemas.openxmlformats.org/officeDocument/2006/math" xmlns="" val="1"/>
+                <ma14:wrappingTextBoxFlag xmlns="" xmlns:m="http://schemas.openxmlformats.org/officeDocument/2006/math" xmlns:a14="http://schemas.microsoft.com/office/drawing/2010/main" xmlns:ma14="http://schemas.microsoft.com/office/mac/drawingml/2011/main" val="1"/>
               </a:ext>
             </a:extLst>
           </p:spPr>
@@ -18057,11 +18087,11 @@
   <p:clrMapOvr>
     <a:masterClrMapping/>
   </p:clrMapOvr>
-  <mc:AlternateContent xmlns:mc="http://schemas.openxmlformats.org/markup-compatibility/2006">
-    <mc:Choice xmlns:p14="http://schemas.microsoft.com/office/powerpoint/2010/main" Requires="p14">
+  <mc:AlternateContent xmlns:mc="http://schemas.openxmlformats.org/markup-compatibility/2006" xmlns:p14="http://schemas.microsoft.com/office/powerpoint/2010/main">
+    <mc:Choice Requires="p14">
       <p:transition p14:dur="0"/>
     </mc:Choice>
-    <mc:Fallback>
+    <mc:Fallback xmlns="">
       <p:transition/>
     </mc:Fallback>
   </mc:AlternateContent>
@@ -18104,7 +18134,7 @@
           </a:ln>
           <a:extLst>
             <a:ext uri="{C572A759-6A51-4108-AA02-DFA0A04FC94B}">
-              <ma14:wrappingTextBoxFlag xmlns:ma14="http://schemas.microsoft.com/office/mac/drawingml/2011/main" xmlns:a14="http://schemas.microsoft.com/office/drawing/2010/main" xmlns:m="http://schemas.openxmlformats.org/officeDocument/2006/math" xmlns="" val="1"/>
+              <ma14:wrappingTextBoxFlag xmlns="" xmlns:m="http://schemas.openxmlformats.org/officeDocument/2006/math" xmlns:a14="http://schemas.microsoft.com/office/drawing/2010/main" xmlns:ma14="http://schemas.microsoft.com/office/mac/drawingml/2011/main" val="1"/>
             </a:ext>
           </a:extLst>
         </p:spPr>
@@ -18183,7 +18213,7 @@
           </a:ln>
           <a:extLst>
             <a:ext uri="{C572A759-6A51-4108-AA02-DFA0A04FC94B}">
-              <ma14:wrappingTextBoxFlag xmlns:ma14="http://schemas.microsoft.com/office/mac/drawingml/2011/main" xmlns:a14="http://schemas.microsoft.com/office/drawing/2010/main" xmlns:m="http://schemas.openxmlformats.org/officeDocument/2006/math" xmlns="" val="1"/>
+              <ma14:wrappingTextBoxFlag xmlns="" xmlns:m="http://schemas.openxmlformats.org/officeDocument/2006/math" xmlns:a14="http://schemas.microsoft.com/office/drawing/2010/main" xmlns:ma14="http://schemas.microsoft.com/office/mac/drawingml/2011/main" val="1"/>
             </a:ext>
           </a:extLst>
         </p:spPr>
@@ -18376,7 +18406,7 @@
               </a:effectLst>
               <a:extLst>
                 <a:ext uri="{C572A759-6A51-4108-AA02-DFA0A04FC94B}">
-                  <ma14:wrappingTextBoxFlag xmlns:ma14="http://schemas.microsoft.com/office/mac/drawingml/2011/main" xmlns:a14="http://schemas.microsoft.com/office/drawing/2010/main" xmlns:m="http://schemas.openxmlformats.org/officeDocument/2006/math" xmlns="" val="1"/>
+                  <ma14:wrappingTextBoxFlag xmlns="" xmlns:m="http://schemas.openxmlformats.org/officeDocument/2006/math" xmlns:a14="http://schemas.microsoft.com/office/drawing/2010/main" xmlns:ma14="http://schemas.microsoft.com/office/mac/drawingml/2011/main" val="1"/>
                 </a:ext>
               </a:extLst>
             </p:spPr>
@@ -18506,7 +18536,7 @@
               </a:effectLst>
               <a:extLst>
                 <a:ext uri="{C572A759-6A51-4108-AA02-DFA0A04FC94B}">
-                  <ma14:wrappingTextBoxFlag xmlns:ma14="http://schemas.microsoft.com/office/mac/drawingml/2011/main" xmlns:a14="http://schemas.microsoft.com/office/drawing/2010/main" xmlns:m="http://schemas.openxmlformats.org/officeDocument/2006/math" xmlns="" val="1"/>
+                  <ma14:wrappingTextBoxFlag xmlns="" xmlns:m="http://schemas.openxmlformats.org/officeDocument/2006/math" xmlns:a14="http://schemas.microsoft.com/office/drawing/2010/main" xmlns:ma14="http://schemas.microsoft.com/office/mac/drawingml/2011/main" val="1"/>
                 </a:ext>
               </a:extLst>
             </p:spPr>
@@ -18636,7 +18666,7 @@
               </a:effectLst>
               <a:extLst>
                 <a:ext uri="{C572A759-6A51-4108-AA02-DFA0A04FC94B}">
-                  <ma14:wrappingTextBoxFlag xmlns:ma14="http://schemas.microsoft.com/office/mac/drawingml/2011/main" xmlns:a14="http://schemas.microsoft.com/office/drawing/2010/main" xmlns:m="http://schemas.openxmlformats.org/officeDocument/2006/math" xmlns="" val="1"/>
+                  <ma14:wrappingTextBoxFlag xmlns="" xmlns:m="http://schemas.openxmlformats.org/officeDocument/2006/math" xmlns:a14="http://schemas.microsoft.com/office/drawing/2010/main" xmlns:ma14="http://schemas.microsoft.com/office/mac/drawingml/2011/main" val="1"/>
                 </a:ext>
               </a:extLst>
             </p:spPr>
@@ -18766,7 +18796,7 @@
               </a:effectLst>
               <a:extLst>
                 <a:ext uri="{C572A759-6A51-4108-AA02-DFA0A04FC94B}">
-                  <ma14:wrappingTextBoxFlag xmlns:ma14="http://schemas.microsoft.com/office/mac/drawingml/2011/main" xmlns:a14="http://schemas.microsoft.com/office/drawing/2010/main" xmlns:m="http://schemas.openxmlformats.org/officeDocument/2006/math" xmlns="" val="1"/>
+                  <ma14:wrappingTextBoxFlag xmlns="" xmlns:m="http://schemas.openxmlformats.org/officeDocument/2006/math" xmlns:a14="http://schemas.microsoft.com/office/drawing/2010/main" xmlns:ma14="http://schemas.microsoft.com/office/mac/drawingml/2011/main" val="1"/>
                 </a:ext>
               </a:extLst>
             </p:spPr>
@@ -18818,7 +18848,7 @@
             <a:effectLst/>
             <a:extLst>
               <a:ext uri="{C572A759-6A51-4108-AA02-DFA0A04FC94B}">
-                <ma14:wrappingTextBoxFlag xmlns:ma14="http://schemas.microsoft.com/office/mac/drawingml/2011/main" xmlns:a14="http://schemas.microsoft.com/office/drawing/2010/main" xmlns:m="http://schemas.openxmlformats.org/officeDocument/2006/math" xmlns="" val="1"/>
+                <ma14:wrappingTextBoxFlag xmlns="" xmlns:m="http://schemas.openxmlformats.org/officeDocument/2006/math" xmlns:a14="http://schemas.microsoft.com/office/drawing/2010/main" xmlns:ma14="http://schemas.microsoft.com/office/mac/drawingml/2011/main" val="1"/>
               </a:ext>
             </a:extLst>
           </p:spPr>
@@ -18869,7 +18899,7 @@
             <a:effectLst/>
             <a:extLst>
               <a:ext uri="{C572A759-6A51-4108-AA02-DFA0A04FC94B}">
-                <ma14:wrappingTextBoxFlag xmlns:ma14="http://schemas.microsoft.com/office/mac/drawingml/2011/main" xmlns:a14="http://schemas.microsoft.com/office/drawing/2010/main" xmlns:m="http://schemas.openxmlformats.org/officeDocument/2006/math" xmlns="" val="1"/>
+                <ma14:wrappingTextBoxFlag xmlns="" xmlns:m="http://schemas.openxmlformats.org/officeDocument/2006/math" xmlns:a14="http://schemas.microsoft.com/office/drawing/2010/main" xmlns:ma14="http://schemas.microsoft.com/office/mac/drawingml/2011/main" val="1"/>
               </a:ext>
             </a:extLst>
           </p:spPr>
@@ -19015,7 +19045,7 @@
             </a:effectLst>
             <a:extLst>
               <a:ext uri="{C572A759-6A51-4108-AA02-DFA0A04FC94B}">
-                <ma14:wrappingTextBoxFlag xmlns:ma14="http://schemas.microsoft.com/office/mac/drawingml/2011/main" xmlns:a14="http://schemas.microsoft.com/office/drawing/2010/main" xmlns:m="http://schemas.openxmlformats.org/officeDocument/2006/math" xmlns="" val="1"/>
+                <ma14:wrappingTextBoxFlag xmlns="" xmlns:m="http://schemas.openxmlformats.org/officeDocument/2006/math" xmlns:a14="http://schemas.microsoft.com/office/drawing/2010/main" xmlns:ma14="http://schemas.microsoft.com/office/mac/drawingml/2011/main" val="1"/>
               </a:ext>
             </a:extLst>
           </p:spPr>
@@ -19121,7 +19151,7 @@
           </a:effectLst>
           <a:extLst>
             <a:ext uri="{C572A759-6A51-4108-AA02-DFA0A04FC94B}">
-              <ma14:wrappingTextBoxFlag xmlns:ma14="http://schemas.microsoft.com/office/mac/drawingml/2011/main" xmlns:a14="http://schemas.microsoft.com/office/drawing/2010/main" xmlns:m="http://schemas.openxmlformats.org/officeDocument/2006/math" xmlns="" val="1"/>
+              <ma14:wrappingTextBoxFlag xmlns="" xmlns:m="http://schemas.openxmlformats.org/officeDocument/2006/math" xmlns:a14="http://schemas.microsoft.com/office/drawing/2010/main" xmlns:ma14="http://schemas.microsoft.com/office/mac/drawingml/2011/main" val="1"/>
             </a:ext>
           </a:extLst>
         </p:spPr>
@@ -19181,7 +19211,7 @@
           </a:effectLst>
           <a:extLst>
             <a:ext uri="{C572A759-6A51-4108-AA02-DFA0A04FC94B}">
-              <ma14:wrappingTextBoxFlag xmlns:ma14="http://schemas.microsoft.com/office/mac/drawingml/2011/main" xmlns:a14="http://schemas.microsoft.com/office/drawing/2010/main" xmlns:m="http://schemas.openxmlformats.org/officeDocument/2006/math" xmlns="" val="1"/>
+              <ma14:wrappingTextBoxFlag xmlns="" xmlns:m="http://schemas.openxmlformats.org/officeDocument/2006/math" xmlns:a14="http://schemas.microsoft.com/office/drawing/2010/main" xmlns:ma14="http://schemas.microsoft.com/office/mac/drawingml/2011/main" val="1"/>
             </a:ext>
           </a:extLst>
         </p:spPr>
@@ -19241,7 +19271,7 @@
           </a:effectLst>
           <a:extLst>
             <a:ext uri="{C572A759-6A51-4108-AA02-DFA0A04FC94B}">
-              <ma14:wrappingTextBoxFlag xmlns:ma14="http://schemas.microsoft.com/office/mac/drawingml/2011/main" xmlns:a14="http://schemas.microsoft.com/office/drawing/2010/main" xmlns:m="http://schemas.openxmlformats.org/officeDocument/2006/math" xmlns="" val="1"/>
+              <ma14:wrappingTextBoxFlag xmlns="" xmlns:m="http://schemas.openxmlformats.org/officeDocument/2006/math" xmlns:a14="http://schemas.microsoft.com/office/drawing/2010/main" xmlns:ma14="http://schemas.microsoft.com/office/mac/drawingml/2011/main" val="1"/>
             </a:ext>
           </a:extLst>
         </p:spPr>
@@ -19320,7 +19350,7 @@
             <a:effectLst/>
             <a:extLst>
               <a:ext uri="{C572A759-6A51-4108-AA02-DFA0A04FC94B}">
-                <ma14:wrappingTextBoxFlag xmlns:ma14="http://schemas.microsoft.com/office/mac/drawingml/2011/main" xmlns:a14="http://schemas.microsoft.com/office/drawing/2010/main" xmlns:m="http://schemas.openxmlformats.org/officeDocument/2006/math" xmlns="" val="1"/>
+                <ma14:wrappingTextBoxFlag xmlns="" xmlns:m="http://schemas.openxmlformats.org/officeDocument/2006/math" xmlns:a14="http://schemas.microsoft.com/office/drawing/2010/main" xmlns:ma14="http://schemas.microsoft.com/office/mac/drawingml/2011/main" val="1"/>
               </a:ext>
             </a:extLst>
           </p:spPr>
@@ -19432,7 +19462,7 @@
             <a:effectLst/>
             <a:extLst>
               <a:ext uri="{C572A759-6A51-4108-AA02-DFA0A04FC94B}">
-                <ma14:wrappingTextBoxFlag xmlns:ma14="http://schemas.microsoft.com/office/mac/drawingml/2011/main" xmlns:a14="http://schemas.microsoft.com/office/drawing/2010/main" xmlns:m="http://schemas.openxmlformats.org/officeDocument/2006/math" xmlns="" val="1"/>
+                <ma14:wrappingTextBoxFlag xmlns="" xmlns:m="http://schemas.openxmlformats.org/officeDocument/2006/math" xmlns:a14="http://schemas.microsoft.com/office/drawing/2010/main" xmlns:ma14="http://schemas.microsoft.com/office/mac/drawingml/2011/main" val="1"/>
               </a:ext>
             </a:extLst>
           </p:spPr>
@@ -19544,7 +19574,7 @@
             <a:effectLst/>
             <a:extLst>
               <a:ext uri="{C572A759-6A51-4108-AA02-DFA0A04FC94B}">
-                <ma14:wrappingTextBoxFlag xmlns:ma14="http://schemas.microsoft.com/office/mac/drawingml/2011/main" xmlns:a14="http://schemas.microsoft.com/office/drawing/2010/main" xmlns:m="http://schemas.openxmlformats.org/officeDocument/2006/math" xmlns="" val="1"/>
+                <ma14:wrappingTextBoxFlag xmlns="" xmlns:m="http://schemas.openxmlformats.org/officeDocument/2006/math" xmlns:a14="http://schemas.microsoft.com/office/drawing/2010/main" xmlns:ma14="http://schemas.microsoft.com/office/mac/drawingml/2011/main" val="1"/>
               </a:ext>
             </a:extLst>
           </p:spPr>
@@ -19625,11 +19655,11 @@
   <p:clrMapOvr>
     <a:masterClrMapping/>
   </p:clrMapOvr>
-  <mc:AlternateContent xmlns:mc="http://schemas.openxmlformats.org/markup-compatibility/2006">
-    <mc:Choice xmlns:p14="http://schemas.microsoft.com/office/powerpoint/2010/main" Requires="p14">
+  <mc:AlternateContent xmlns:mc="http://schemas.openxmlformats.org/markup-compatibility/2006" xmlns:p14="http://schemas.microsoft.com/office/powerpoint/2010/main">
+    <mc:Choice Requires="p14">
       <p:transition p14:dur="0"/>
     </mc:Choice>
-    <mc:Fallback>
+    <mc:Fallback xmlns="">
       <p:transition/>
     </mc:Fallback>
   </mc:AlternateContent>
@@ -20121,7 +20151,7 @@
           </a:ln>
           <a:extLst>
             <a:ext uri="{C572A759-6A51-4108-AA02-DFA0A04FC94B}">
-              <ma14:wrappingTextBoxFlag xmlns:ma14="http://schemas.microsoft.com/office/mac/drawingml/2011/main" xmlns:a14="http://schemas.microsoft.com/office/drawing/2010/main" xmlns:m="http://schemas.openxmlformats.org/officeDocument/2006/math" xmlns="" val="1"/>
+              <ma14:wrappingTextBoxFlag xmlns="" xmlns:m="http://schemas.openxmlformats.org/officeDocument/2006/math" xmlns:a14="http://schemas.microsoft.com/office/drawing/2010/main" xmlns:ma14="http://schemas.microsoft.com/office/mac/drawingml/2011/main" val="1"/>
             </a:ext>
           </a:extLst>
         </p:spPr>
@@ -20248,7 +20278,7 @@
           </a:ln>
           <a:extLst>
             <a:ext uri="{C572A759-6A51-4108-AA02-DFA0A04FC94B}">
-              <ma14:wrappingTextBoxFlag xmlns:ma14="http://schemas.microsoft.com/office/mac/drawingml/2011/main" xmlns:a14="http://schemas.microsoft.com/office/drawing/2010/main" xmlns:m="http://schemas.openxmlformats.org/officeDocument/2006/math" xmlns="" val="1"/>
+              <ma14:wrappingTextBoxFlag xmlns="" xmlns:m="http://schemas.openxmlformats.org/officeDocument/2006/math" xmlns:a14="http://schemas.microsoft.com/office/drawing/2010/main" xmlns:ma14="http://schemas.microsoft.com/office/mac/drawingml/2011/main" val="1"/>
             </a:ext>
           </a:extLst>
         </p:spPr>
@@ -20441,7 +20471,7 @@
               </a:effectLst>
               <a:extLst>
                 <a:ext uri="{C572A759-6A51-4108-AA02-DFA0A04FC94B}">
-                  <ma14:wrappingTextBoxFlag xmlns:ma14="http://schemas.microsoft.com/office/mac/drawingml/2011/main" xmlns:a14="http://schemas.microsoft.com/office/drawing/2010/main" xmlns:m="http://schemas.openxmlformats.org/officeDocument/2006/math" xmlns="" val="1"/>
+                  <ma14:wrappingTextBoxFlag xmlns="" xmlns:m="http://schemas.openxmlformats.org/officeDocument/2006/math" xmlns:a14="http://schemas.microsoft.com/office/drawing/2010/main" xmlns:ma14="http://schemas.microsoft.com/office/mac/drawingml/2011/main" val="1"/>
                 </a:ext>
               </a:extLst>
             </p:spPr>
@@ -20571,7 +20601,7 @@
               </a:effectLst>
               <a:extLst>
                 <a:ext uri="{C572A759-6A51-4108-AA02-DFA0A04FC94B}">
-                  <ma14:wrappingTextBoxFlag xmlns:ma14="http://schemas.microsoft.com/office/mac/drawingml/2011/main" xmlns:a14="http://schemas.microsoft.com/office/drawing/2010/main" xmlns:m="http://schemas.openxmlformats.org/officeDocument/2006/math" xmlns="" val="1"/>
+                  <ma14:wrappingTextBoxFlag xmlns="" xmlns:m="http://schemas.openxmlformats.org/officeDocument/2006/math" xmlns:a14="http://schemas.microsoft.com/office/drawing/2010/main" xmlns:ma14="http://schemas.microsoft.com/office/mac/drawingml/2011/main" val="1"/>
                 </a:ext>
               </a:extLst>
             </p:spPr>
@@ -20701,7 +20731,7 @@
               </a:effectLst>
               <a:extLst>
                 <a:ext uri="{C572A759-6A51-4108-AA02-DFA0A04FC94B}">
-                  <ma14:wrappingTextBoxFlag xmlns:ma14="http://schemas.microsoft.com/office/mac/drawingml/2011/main" xmlns:a14="http://schemas.microsoft.com/office/drawing/2010/main" xmlns:m="http://schemas.openxmlformats.org/officeDocument/2006/math" xmlns="" val="1"/>
+                  <ma14:wrappingTextBoxFlag xmlns="" xmlns:m="http://schemas.openxmlformats.org/officeDocument/2006/math" xmlns:a14="http://schemas.microsoft.com/office/drawing/2010/main" xmlns:ma14="http://schemas.microsoft.com/office/mac/drawingml/2011/main" val="1"/>
                 </a:ext>
               </a:extLst>
             </p:spPr>
@@ -20831,7 +20861,7 @@
               </a:effectLst>
               <a:extLst>
                 <a:ext uri="{C572A759-6A51-4108-AA02-DFA0A04FC94B}">
-                  <ma14:wrappingTextBoxFlag xmlns:ma14="http://schemas.microsoft.com/office/mac/drawingml/2011/main" xmlns:a14="http://schemas.microsoft.com/office/drawing/2010/main" xmlns:m="http://schemas.openxmlformats.org/officeDocument/2006/math" xmlns="" val="1"/>
+                  <ma14:wrappingTextBoxFlag xmlns="" xmlns:m="http://schemas.openxmlformats.org/officeDocument/2006/math" xmlns:a14="http://schemas.microsoft.com/office/drawing/2010/main" xmlns:ma14="http://schemas.microsoft.com/office/mac/drawingml/2011/main" val="1"/>
                 </a:ext>
               </a:extLst>
             </p:spPr>
@@ -20883,7 +20913,7 @@
             <a:effectLst/>
             <a:extLst>
               <a:ext uri="{C572A759-6A51-4108-AA02-DFA0A04FC94B}">
-                <ma14:wrappingTextBoxFlag xmlns:ma14="http://schemas.microsoft.com/office/mac/drawingml/2011/main" xmlns:a14="http://schemas.microsoft.com/office/drawing/2010/main" xmlns:m="http://schemas.openxmlformats.org/officeDocument/2006/math" xmlns="" val="1"/>
+                <ma14:wrappingTextBoxFlag xmlns="" xmlns:m="http://schemas.openxmlformats.org/officeDocument/2006/math" xmlns:a14="http://schemas.microsoft.com/office/drawing/2010/main" xmlns:ma14="http://schemas.microsoft.com/office/mac/drawingml/2011/main" val="1"/>
               </a:ext>
             </a:extLst>
           </p:spPr>
@@ -20934,7 +20964,7 @@
             <a:effectLst/>
             <a:extLst>
               <a:ext uri="{C572A759-6A51-4108-AA02-DFA0A04FC94B}">
-                <ma14:wrappingTextBoxFlag xmlns:ma14="http://schemas.microsoft.com/office/mac/drawingml/2011/main" xmlns:a14="http://schemas.microsoft.com/office/drawing/2010/main" xmlns:m="http://schemas.openxmlformats.org/officeDocument/2006/math" xmlns="" val="1"/>
+                <ma14:wrappingTextBoxFlag xmlns="" xmlns:m="http://schemas.openxmlformats.org/officeDocument/2006/math" xmlns:a14="http://schemas.microsoft.com/office/drawing/2010/main" xmlns:ma14="http://schemas.microsoft.com/office/mac/drawingml/2011/main" val="1"/>
               </a:ext>
             </a:extLst>
           </p:spPr>
@@ -21080,7 +21110,7 @@
             </a:effectLst>
             <a:extLst>
               <a:ext uri="{C572A759-6A51-4108-AA02-DFA0A04FC94B}">
-                <ma14:wrappingTextBoxFlag xmlns:ma14="http://schemas.microsoft.com/office/mac/drawingml/2011/main" xmlns:a14="http://schemas.microsoft.com/office/drawing/2010/main" xmlns:m="http://schemas.openxmlformats.org/officeDocument/2006/math" xmlns="" val="1"/>
+                <ma14:wrappingTextBoxFlag xmlns="" xmlns:m="http://schemas.openxmlformats.org/officeDocument/2006/math" xmlns:a14="http://schemas.microsoft.com/office/drawing/2010/main" xmlns:ma14="http://schemas.microsoft.com/office/mac/drawingml/2011/main" val="1"/>
               </a:ext>
             </a:extLst>
           </p:spPr>
@@ -21176,7 +21206,7 @@
           </a:ln>
           <a:extLst>
             <a:ext uri="{C572A759-6A51-4108-AA02-DFA0A04FC94B}">
-              <ma14:wrappingTextBoxFlag xmlns:ma14="http://schemas.microsoft.com/office/mac/drawingml/2011/main" xmlns:a14="http://schemas.microsoft.com/office/drawing/2010/main" xmlns:m="http://schemas.openxmlformats.org/officeDocument/2006/math" xmlns="" val="1"/>
+              <ma14:wrappingTextBoxFlag xmlns="" xmlns:m="http://schemas.openxmlformats.org/officeDocument/2006/math" xmlns:a14="http://schemas.microsoft.com/office/drawing/2010/main" xmlns:ma14="http://schemas.microsoft.com/office/mac/drawingml/2011/main" val="1"/>
             </a:ext>
           </a:extLst>
         </p:spPr>
@@ -21224,7 +21254,7 @@
           </a:ln>
           <a:extLst>
             <a:ext uri="{C572A759-6A51-4108-AA02-DFA0A04FC94B}">
-              <ma14:wrappingTextBoxFlag xmlns:ma14="http://schemas.microsoft.com/office/mac/drawingml/2011/main" xmlns:a14="http://schemas.microsoft.com/office/drawing/2010/main" xmlns:m="http://schemas.openxmlformats.org/officeDocument/2006/math" xmlns="" val="1"/>
+              <ma14:wrappingTextBoxFlag xmlns="" xmlns:m="http://schemas.openxmlformats.org/officeDocument/2006/math" xmlns:a14="http://schemas.microsoft.com/office/drawing/2010/main" xmlns:ma14="http://schemas.microsoft.com/office/mac/drawingml/2011/main" val="1"/>
             </a:ext>
           </a:extLst>
         </p:spPr>
@@ -21272,7 +21302,7 @@
           </a:ln>
           <a:extLst>
             <a:ext uri="{C572A759-6A51-4108-AA02-DFA0A04FC94B}">
-              <ma14:wrappingTextBoxFlag xmlns:ma14="http://schemas.microsoft.com/office/mac/drawingml/2011/main" xmlns:a14="http://schemas.microsoft.com/office/drawing/2010/main" xmlns:m="http://schemas.openxmlformats.org/officeDocument/2006/math" xmlns="" val="1"/>
+              <ma14:wrappingTextBoxFlag xmlns="" xmlns:m="http://schemas.openxmlformats.org/officeDocument/2006/math" xmlns:a14="http://schemas.microsoft.com/office/drawing/2010/main" xmlns:ma14="http://schemas.microsoft.com/office/mac/drawingml/2011/main" val="1"/>
             </a:ext>
           </a:extLst>
         </p:spPr>
@@ -21330,7 +21360,7 @@
           </a:effectLst>
           <a:extLst>
             <a:ext uri="{C572A759-6A51-4108-AA02-DFA0A04FC94B}">
-              <ma14:wrappingTextBoxFlag xmlns:ma14="http://schemas.microsoft.com/office/mac/drawingml/2011/main" xmlns:a14="http://schemas.microsoft.com/office/drawing/2010/main" xmlns:m="http://schemas.openxmlformats.org/officeDocument/2006/math" xmlns="" val="1"/>
+              <ma14:wrappingTextBoxFlag xmlns="" xmlns:m="http://schemas.openxmlformats.org/officeDocument/2006/math" xmlns:a14="http://schemas.microsoft.com/office/drawing/2010/main" xmlns:ma14="http://schemas.microsoft.com/office/mac/drawingml/2011/main" val="1"/>
             </a:ext>
           </a:extLst>
         </p:spPr>
@@ -21390,7 +21420,7 @@
           </a:effectLst>
           <a:extLst>
             <a:ext uri="{C572A759-6A51-4108-AA02-DFA0A04FC94B}">
-              <ma14:wrappingTextBoxFlag xmlns:ma14="http://schemas.microsoft.com/office/mac/drawingml/2011/main" xmlns:a14="http://schemas.microsoft.com/office/drawing/2010/main" xmlns:m="http://schemas.openxmlformats.org/officeDocument/2006/math" xmlns="" val="1"/>
+              <ma14:wrappingTextBoxFlag xmlns="" xmlns:m="http://schemas.openxmlformats.org/officeDocument/2006/math" xmlns:a14="http://schemas.microsoft.com/office/drawing/2010/main" xmlns:ma14="http://schemas.microsoft.com/office/mac/drawingml/2011/main" val="1"/>
             </a:ext>
           </a:extLst>
         </p:spPr>
@@ -21450,7 +21480,7 @@
           </a:effectLst>
           <a:extLst>
             <a:ext uri="{C572A759-6A51-4108-AA02-DFA0A04FC94B}">
-              <ma14:wrappingTextBoxFlag xmlns:ma14="http://schemas.microsoft.com/office/mac/drawingml/2011/main" xmlns:a14="http://schemas.microsoft.com/office/drawing/2010/main" xmlns:m="http://schemas.openxmlformats.org/officeDocument/2006/math" xmlns="" val="1"/>
+              <ma14:wrappingTextBoxFlag xmlns="" xmlns:m="http://schemas.openxmlformats.org/officeDocument/2006/math" xmlns:a14="http://schemas.microsoft.com/office/drawing/2010/main" xmlns:ma14="http://schemas.microsoft.com/office/mac/drawingml/2011/main" val="1"/>
             </a:ext>
           </a:extLst>
         </p:spPr>
@@ -21486,11 +21516,11 @@
   <p:clrMapOvr>
     <a:masterClrMapping/>
   </p:clrMapOvr>
-  <mc:AlternateContent xmlns:mc="http://schemas.openxmlformats.org/markup-compatibility/2006">
-    <mc:Choice xmlns:p14="http://schemas.microsoft.com/office/powerpoint/2010/main" Requires="p14">
+  <mc:AlternateContent xmlns:mc="http://schemas.openxmlformats.org/markup-compatibility/2006" xmlns:p14="http://schemas.microsoft.com/office/powerpoint/2010/main">
+    <mc:Choice Requires="p14">
       <p:transition p14:dur="0"/>
     </mc:Choice>
-    <mc:Fallback>
+    <mc:Fallback xmlns="">
       <p:transition/>
     </mc:Fallback>
   </mc:AlternateContent>
@@ -21700,7 +21730,7 @@
           </a:ln>
           <a:extLst>
             <a:ext uri="{C572A759-6A51-4108-AA02-DFA0A04FC94B}">
-              <ma14:wrappingTextBoxFlag xmlns:ma14="http://schemas.microsoft.com/office/mac/drawingml/2011/main" xmlns:a14="http://schemas.microsoft.com/office/drawing/2010/main" xmlns:m="http://schemas.openxmlformats.org/officeDocument/2006/math" xmlns="" val="1"/>
+              <ma14:wrappingTextBoxFlag xmlns="" xmlns:m="http://schemas.openxmlformats.org/officeDocument/2006/math" xmlns:a14="http://schemas.microsoft.com/office/drawing/2010/main" xmlns:ma14="http://schemas.microsoft.com/office/mac/drawingml/2011/main" val="1"/>
             </a:ext>
           </a:extLst>
         </p:spPr>
@@ -21827,7 +21857,7 @@
           </a:ln>
           <a:extLst>
             <a:ext uri="{C572A759-6A51-4108-AA02-DFA0A04FC94B}">
-              <ma14:wrappingTextBoxFlag xmlns:ma14="http://schemas.microsoft.com/office/mac/drawingml/2011/main" xmlns:a14="http://schemas.microsoft.com/office/drawing/2010/main" xmlns:m="http://schemas.openxmlformats.org/officeDocument/2006/math" xmlns="" val="1"/>
+              <ma14:wrappingTextBoxFlag xmlns="" xmlns:m="http://schemas.openxmlformats.org/officeDocument/2006/math" xmlns:a14="http://schemas.microsoft.com/office/drawing/2010/main" xmlns:ma14="http://schemas.microsoft.com/office/mac/drawingml/2011/main" val="1"/>
             </a:ext>
           </a:extLst>
         </p:spPr>
@@ -22020,7 +22050,7 @@
               </a:effectLst>
               <a:extLst>
                 <a:ext uri="{C572A759-6A51-4108-AA02-DFA0A04FC94B}">
-                  <ma14:wrappingTextBoxFlag xmlns:ma14="http://schemas.microsoft.com/office/mac/drawingml/2011/main" xmlns:a14="http://schemas.microsoft.com/office/drawing/2010/main" xmlns:m="http://schemas.openxmlformats.org/officeDocument/2006/math" xmlns="" val="1"/>
+                  <ma14:wrappingTextBoxFlag xmlns="" xmlns:m="http://schemas.openxmlformats.org/officeDocument/2006/math" xmlns:a14="http://schemas.microsoft.com/office/drawing/2010/main" xmlns:ma14="http://schemas.microsoft.com/office/mac/drawingml/2011/main" val="1"/>
                 </a:ext>
               </a:extLst>
             </p:spPr>
@@ -22150,7 +22180,7 @@
               </a:effectLst>
               <a:extLst>
                 <a:ext uri="{C572A759-6A51-4108-AA02-DFA0A04FC94B}">
-                  <ma14:wrappingTextBoxFlag xmlns:ma14="http://schemas.microsoft.com/office/mac/drawingml/2011/main" xmlns:a14="http://schemas.microsoft.com/office/drawing/2010/main" xmlns:m="http://schemas.openxmlformats.org/officeDocument/2006/math" xmlns="" val="1"/>
+                  <ma14:wrappingTextBoxFlag xmlns="" xmlns:m="http://schemas.openxmlformats.org/officeDocument/2006/math" xmlns:a14="http://schemas.microsoft.com/office/drawing/2010/main" xmlns:ma14="http://schemas.microsoft.com/office/mac/drawingml/2011/main" val="1"/>
                 </a:ext>
               </a:extLst>
             </p:spPr>
@@ -22280,7 +22310,7 @@
               </a:effectLst>
               <a:extLst>
                 <a:ext uri="{C572A759-6A51-4108-AA02-DFA0A04FC94B}">
-                  <ma14:wrappingTextBoxFlag xmlns:ma14="http://schemas.microsoft.com/office/mac/drawingml/2011/main" xmlns:a14="http://schemas.microsoft.com/office/drawing/2010/main" xmlns:m="http://schemas.openxmlformats.org/officeDocument/2006/math" xmlns="" val="1"/>
+                  <ma14:wrappingTextBoxFlag xmlns="" xmlns:m="http://schemas.openxmlformats.org/officeDocument/2006/math" xmlns:a14="http://schemas.microsoft.com/office/drawing/2010/main" xmlns:ma14="http://schemas.microsoft.com/office/mac/drawingml/2011/main" val="1"/>
                 </a:ext>
               </a:extLst>
             </p:spPr>
@@ -22410,7 +22440,7 @@
               </a:effectLst>
               <a:extLst>
                 <a:ext uri="{C572A759-6A51-4108-AA02-DFA0A04FC94B}">
-                  <ma14:wrappingTextBoxFlag xmlns:ma14="http://schemas.microsoft.com/office/mac/drawingml/2011/main" xmlns:a14="http://schemas.microsoft.com/office/drawing/2010/main" xmlns:m="http://schemas.openxmlformats.org/officeDocument/2006/math" xmlns="" val="1"/>
+                  <ma14:wrappingTextBoxFlag xmlns="" xmlns:m="http://schemas.openxmlformats.org/officeDocument/2006/math" xmlns:a14="http://schemas.microsoft.com/office/drawing/2010/main" xmlns:ma14="http://schemas.microsoft.com/office/mac/drawingml/2011/main" val="1"/>
                 </a:ext>
               </a:extLst>
             </p:spPr>
@@ -22462,7 +22492,7 @@
             <a:effectLst/>
             <a:extLst>
               <a:ext uri="{C572A759-6A51-4108-AA02-DFA0A04FC94B}">
-                <ma14:wrappingTextBoxFlag xmlns:ma14="http://schemas.microsoft.com/office/mac/drawingml/2011/main" xmlns:a14="http://schemas.microsoft.com/office/drawing/2010/main" xmlns:m="http://schemas.openxmlformats.org/officeDocument/2006/math" xmlns="" val="1"/>
+                <ma14:wrappingTextBoxFlag xmlns="" xmlns:m="http://schemas.openxmlformats.org/officeDocument/2006/math" xmlns:a14="http://schemas.microsoft.com/office/drawing/2010/main" xmlns:ma14="http://schemas.microsoft.com/office/mac/drawingml/2011/main" val="1"/>
               </a:ext>
             </a:extLst>
           </p:spPr>
@@ -22513,7 +22543,7 @@
             <a:effectLst/>
             <a:extLst>
               <a:ext uri="{C572A759-6A51-4108-AA02-DFA0A04FC94B}">
-                <ma14:wrappingTextBoxFlag xmlns:ma14="http://schemas.microsoft.com/office/mac/drawingml/2011/main" xmlns:a14="http://schemas.microsoft.com/office/drawing/2010/main" xmlns:m="http://schemas.openxmlformats.org/officeDocument/2006/math" xmlns="" val="1"/>
+                <ma14:wrappingTextBoxFlag xmlns="" xmlns:m="http://schemas.openxmlformats.org/officeDocument/2006/math" xmlns:a14="http://schemas.microsoft.com/office/drawing/2010/main" xmlns:ma14="http://schemas.microsoft.com/office/mac/drawingml/2011/main" val="1"/>
               </a:ext>
             </a:extLst>
           </p:spPr>
@@ -22659,7 +22689,7 @@
             </a:effectLst>
             <a:extLst>
               <a:ext uri="{C572A759-6A51-4108-AA02-DFA0A04FC94B}">
-                <ma14:wrappingTextBoxFlag xmlns:ma14="http://schemas.microsoft.com/office/mac/drawingml/2011/main" xmlns:a14="http://schemas.microsoft.com/office/drawing/2010/main" xmlns:m="http://schemas.openxmlformats.org/officeDocument/2006/math" xmlns="" val="1"/>
+                <ma14:wrappingTextBoxFlag xmlns="" xmlns:m="http://schemas.openxmlformats.org/officeDocument/2006/math" xmlns:a14="http://schemas.microsoft.com/office/drawing/2010/main" xmlns:ma14="http://schemas.microsoft.com/office/mac/drawingml/2011/main" val="1"/>
               </a:ext>
             </a:extLst>
           </p:spPr>
@@ -22755,7 +22785,7 @@
           </a:ln>
           <a:extLst>
             <a:ext uri="{C572A759-6A51-4108-AA02-DFA0A04FC94B}">
-              <ma14:wrappingTextBoxFlag xmlns:ma14="http://schemas.microsoft.com/office/mac/drawingml/2011/main" xmlns:a14="http://schemas.microsoft.com/office/drawing/2010/main" xmlns:m="http://schemas.openxmlformats.org/officeDocument/2006/math" xmlns="" val="1"/>
+              <ma14:wrappingTextBoxFlag xmlns="" xmlns:m="http://schemas.openxmlformats.org/officeDocument/2006/math" xmlns:a14="http://schemas.microsoft.com/office/drawing/2010/main" xmlns:ma14="http://schemas.microsoft.com/office/mac/drawingml/2011/main" val="1"/>
             </a:ext>
           </a:extLst>
         </p:spPr>
@@ -22803,7 +22833,7 @@
           </a:ln>
           <a:extLst>
             <a:ext uri="{C572A759-6A51-4108-AA02-DFA0A04FC94B}">
-              <ma14:wrappingTextBoxFlag xmlns:ma14="http://schemas.microsoft.com/office/mac/drawingml/2011/main" xmlns:a14="http://schemas.microsoft.com/office/drawing/2010/main" xmlns:m="http://schemas.openxmlformats.org/officeDocument/2006/math" xmlns="" val="1"/>
+              <ma14:wrappingTextBoxFlag xmlns="" xmlns:m="http://schemas.openxmlformats.org/officeDocument/2006/math" xmlns:a14="http://schemas.microsoft.com/office/drawing/2010/main" xmlns:ma14="http://schemas.microsoft.com/office/mac/drawingml/2011/main" val="1"/>
             </a:ext>
           </a:extLst>
         </p:spPr>
@@ -22851,7 +22881,7 @@
           </a:ln>
           <a:extLst>
             <a:ext uri="{C572A759-6A51-4108-AA02-DFA0A04FC94B}">
-              <ma14:wrappingTextBoxFlag xmlns:ma14="http://schemas.microsoft.com/office/mac/drawingml/2011/main" xmlns:a14="http://schemas.microsoft.com/office/drawing/2010/main" xmlns:m="http://schemas.openxmlformats.org/officeDocument/2006/math" xmlns="" val="1"/>
+              <ma14:wrappingTextBoxFlag xmlns="" xmlns:m="http://schemas.openxmlformats.org/officeDocument/2006/math" xmlns:a14="http://schemas.microsoft.com/office/drawing/2010/main" xmlns:ma14="http://schemas.microsoft.com/office/mac/drawingml/2011/main" val="1"/>
             </a:ext>
           </a:extLst>
         </p:spPr>
@@ -22909,7 +22939,7 @@
           </a:effectLst>
           <a:extLst>
             <a:ext uri="{C572A759-6A51-4108-AA02-DFA0A04FC94B}">
-              <ma14:wrappingTextBoxFlag xmlns:ma14="http://schemas.microsoft.com/office/mac/drawingml/2011/main" xmlns:a14="http://schemas.microsoft.com/office/drawing/2010/main" xmlns:m="http://schemas.openxmlformats.org/officeDocument/2006/math" xmlns="" val="1"/>
+              <ma14:wrappingTextBoxFlag xmlns="" xmlns:m="http://schemas.openxmlformats.org/officeDocument/2006/math" xmlns:a14="http://schemas.microsoft.com/office/drawing/2010/main" xmlns:ma14="http://schemas.microsoft.com/office/mac/drawingml/2011/main" val="1"/>
             </a:ext>
           </a:extLst>
         </p:spPr>
@@ -22969,7 +22999,7 @@
           </a:effectLst>
           <a:extLst>
             <a:ext uri="{C572A759-6A51-4108-AA02-DFA0A04FC94B}">
-              <ma14:wrappingTextBoxFlag xmlns:ma14="http://schemas.microsoft.com/office/mac/drawingml/2011/main" xmlns:a14="http://schemas.microsoft.com/office/drawing/2010/main" xmlns:m="http://schemas.openxmlformats.org/officeDocument/2006/math" xmlns="" val="1"/>
+              <ma14:wrappingTextBoxFlag xmlns="" xmlns:m="http://schemas.openxmlformats.org/officeDocument/2006/math" xmlns:a14="http://schemas.microsoft.com/office/drawing/2010/main" xmlns:ma14="http://schemas.microsoft.com/office/mac/drawingml/2011/main" val="1"/>
             </a:ext>
           </a:extLst>
         </p:spPr>
@@ -23005,11 +23035,11 @@
   <p:clrMapOvr>
     <a:masterClrMapping/>
   </p:clrMapOvr>
-  <mc:AlternateContent xmlns:mc="http://schemas.openxmlformats.org/markup-compatibility/2006">
-    <mc:Choice xmlns:p14="http://schemas.microsoft.com/office/powerpoint/2010/main" Requires="p14">
+  <mc:AlternateContent xmlns:mc="http://schemas.openxmlformats.org/markup-compatibility/2006" xmlns:p14="http://schemas.microsoft.com/office/powerpoint/2010/main">
+    <mc:Choice Requires="p14">
       <p:transition p14:dur="0"/>
     </mc:Choice>
-    <mc:Fallback>
+    <mc:Fallback xmlns="">
       <p:transition/>
     </mc:Fallback>
   </mc:AlternateContent>
@@ -23219,7 +23249,7 @@
           </a:ln>
           <a:extLst>
             <a:ext uri="{C572A759-6A51-4108-AA02-DFA0A04FC94B}">
-              <ma14:wrappingTextBoxFlag xmlns:ma14="http://schemas.microsoft.com/office/mac/drawingml/2011/main" xmlns:a14="http://schemas.microsoft.com/office/drawing/2010/main" xmlns:m="http://schemas.openxmlformats.org/officeDocument/2006/math" xmlns="" val="1"/>
+              <ma14:wrappingTextBoxFlag xmlns="" xmlns:m="http://schemas.openxmlformats.org/officeDocument/2006/math" xmlns:a14="http://schemas.microsoft.com/office/drawing/2010/main" xmlns:ma14="http://schemas.microsoft.com/office/mac/drawingml/2011/main" val="1"/>
             </a:ext>
           </a:extLst>
         </p:spPr>
@@ -23346,7 +23376,7 @@
           </a:ln>
           <a:extLst>
             <a:ext uri="{C572A759-6A51-4108-AA02-DFA0A04FC94B}">
-              <ma14:wrappingTextBoxFlag xmlns:ma14="http://schemas.microsoft.com/office/mac/drawingml/2011/main" xmlns:a14="http://schemas.microsoft.com/office/drawing/2010/main" xmlns:m="http://schemas.openxmlformats.org/officeDocument/2006/math" xmlns="" val="1"/>
+              <ma14:wrappingTextBoxFlag xmlns="" xmlns:m="http://schemas.openxmlformats.org/officeDocument/2006/math" xmlns:a14="http://schemas.microsoft.com/office/drawing/2010/main" xmlns:ma14="http://schemas.microsoft.com/office/mac/drawingml/2011/main" val="1"/>
             </a:ext>
           </a:extLst>
         </p:spPr>
@@ -23539,7 +23569,7 @@
               </a:effectLst>
               <a:extLst>
                 <a:ext uri="{C572A759-6A51-4108-AA02-DFA0A04FC94B}">
-                  <ma14:wrappingTextBoxFlag xmlns:ma14="http://schemas.microsoft.com/office/mac/drawingml/2011/main" xmlns:a14="http://schemas.microsoft.com/office/drawing/2010/main" xmlns:m="http://schemas.openxmlformats.org/officeDocument/2006/math" xmlns="" val="1"/>
+                  <ma14:wrappingTextBoxFlag xmlns="" xmlns:m="http://schemas.openxmlformats.org/officeDocument/2006/math" xmlns:a14="http://schemas.microsoft.com/office/drawing/2010/main" xmlns:ma14="http://schemas.microsoft.com/office/mac/drawingml/2011/main" val="1"/>
                 </a:ext>
               </a:extLst>
             </p:spPr>
@@ -23669,7 +23699,7 @@
               </a:effectLst>
               <a:extLst>
                 <a:ext uri="{C572A759-6A51-4108-AA02-DFA0A04FC94B}">
-                  <ma14:wrappingTextBoxFlag xmlns:ma14="http://schemas.microsoft.com/office/mac/drawingml/2011/main" xmlns:a14="http://schemas.microsoft.com/office/drawing/2010/main" xmlns:m="http://schemas.openxmlformats.org/officeDocument/2006/math" xmlns="" val="1"/>
+                  <ma14:wrappingTextBoxFlag xmlns="" xmlns:m="http://schemas.openxmlformats.org/officeDocument/2006/math" xmlns:a14="http://schemas.microsoft.com/office/drawing/2010/main" xmlns:ma14="http://schemas.microsoft.com/office/mac/drawingml/2011/main" val="1"/>
                 </a:ext>
               </a:extLst>
             </p:spPr>
@@ -23799,7 +23829,7 @@
               </a:effectLst>
               <a:extLst>
                 <a:ext uri="{C572A759-6A51-4108-AA02-DFA0A04FC94B}">
-                  <ma14:wrappingTextBoxFlag xmlns:ma14="http://schemas.microsoft.com/office/mac/drawingml/2011/main" xmlns:a14="http://schemas.microsoft.com/office/drawing/2010/main" xmlns:m="http://schemas.openxmlformats.org/officeDocument/2006/math" xmlns="" val="1"/>
+                  <ma14:wrappingTextBoxFlag xmlns="" xmlns:m="http://schemas.openxmlformats.org/officeDocument/2006/math" xmlns:a14="http://schemas.microsoft.com/office/drawing/2010/main" xmlns:ma14="http://schemas.microsoft.com/office/mac/drawingml/2011/main" val="1"/>
                 </a:ext>
               </a:extLst>
             </p:spPr>
@@ -23929,7 +23959,7 @@
               </a:effectLst>
               <a:extLst>
                 <a:ext uri="{C572A759-6A51-4108-AA02-DFA0A04FC94B}">
-                  <ma14:wrappingTextBoxFlag xmlns:ma14="http://schemas.microsoft.com/office/mac/drawingml/2011/main" xmlns:a14="http://schemas.microsoft.com/office/drawing/2010/main" xmlns:m="http://schemas.openxmlformats.org/officeDocument/2006/math" xmlns="" val="1"/>
+                  <ma14:wrappingTextBoxFlag xmlns="" xmlns:m="http://schemas.openxmlformats.org/officeDocument/2006/math" xmlns:a14="http://schemas.microsoft.com/office/drawing/2010/main" xmlns:ma14="http://schemas.microsoft.com/office/mac/drawingml/2011/main" val="1"/>
                 </a:ext>
               </a:extLst>
             </p:spPr>
@@ -23981,7 +24011,7 @@
             <a:effectLst/>
             <a:extLst>
               <a:ext uri="{C572A759-6A51-4108-AA02-DFA0A04FC94B}">
-                <ma14:wrappingTextBoxFlag xmlns:ma14="http://schemas.microsoft.com/office/mac/drawingml/2011/main" xmlns:a14="http://schemas.microsoft.com/office/drawing/2010/main" xmlns:m="http://schemas.openxmlformats.org/officeDocument/2006/math" xmlns="" val="1"/>
+                <ma14:wrappingTextBoxFlag xmlns="" xmlns:m="http://schemas.openxmlformats.org/officeDocument/2006/math" xmlns:a14="http://schemas.microsoft.com/office/drawing/2010/main" xmlns:ma14="http://schemas.microsoft.com/office/mac/drawingml/2011/main" val="1"/>
               </a:ext>
             </a:extLst>
           </p:spPr>
@@ -24032,7 +24062,7 @@
             <a:effectLst/>
             <a:extLst>
               <a:ext uri="{C572A759-6A51-4108-AA02-DFA0A04FC94B}">
-                <ma14:wrappingTextBoxFlag xmlns:ma14="http://schemas.microsoft.com/office/mac/drawingml/2011/main" xmlns:a14="http://schemas.microsoft.com/office/drawing/2010/main" xmlns:m="http://schemas.openxmlformats.org/officeDocument/2006/math" xmlns="" val="1"/>
+                <ma14:wrappingTextBoxFlag xmlns="" xmlns:m="http://schemas.openxmlformats.org/officeDocument/2006/math" xmlns:a14="http://schemas.microsoft.com/office/drawing/2010/main" xmlns:ma14="http://schemas.microsoft.com/office/mac/drawingml/2011/main" val="1"/>
               </a:ext>
             </a:extLst>
           </p:spPr>
@@ -24178,7 +24208,7 @@
             </a:effectLst>
             <a:extLst>
               <a:ext uri="{C572A759-6A51-4108-AA02-DFA0A04FC94B}">
-                <ma14:wrappingTextBoxFlag xmlns:ma14="http://schemas.microsoft.com/office/mac/drawingml/2011/main" xmlns:a14="http://schemas.microsoft.com/office/drawing/2010/main" xmlns:m="http://schemas.openxmlformats.org/officeDocument/2006/math" xmlns="" val="1"/>
+                <ma14:wrappingTextBoxFlag xmlns="" xmlns:m="http://schemas.openxmlformats.org/officeDocument/2006/math" xmlns:a14="http://schemas.microsoft.com/office/drawing/2010/main" xmlns:ma14="http://schemas.microsoft.com/office/mac/drawingml/2011/main" val="1"/>
               </a:ext>
             </a:extLst>
           </p:spPr>
@@ -24274,7 +24304,7 @@
           </a:ln>
           <a:extLst>
             <a:ext uri="{C572A759-6A51-4108-AA02-DFA0A04FC94B}">
-              <ma14:wrappingTextBoxFlag xmlns:ma14="http://schemas.microsoft.com/office/mac/drawingml/2011/main" xmlns:a14="http://schemas.microsoft.com/office/drawing/2010/main" xmlns:m="http://schemas.openxmlformats.org/officeDocument/2006/math" xmlns="" val="1"/>
+              <ma14:wrappingTextBoxFlag xmlns="" xmlns:m="http://schemas.openxmlformats.org/officeDocument/2006/math" xmlns:a14="http://schemas.microsoft.com/office/drawing/2010/main" xmlns:ma14="http://schemas.microsoft.com/office/mac/drawingml/2011/main" val="1"/>
             </a:ext>
           </a:extLst>
         </p:spPr>
@@ -24322,7 +24352,7 @@
           </a:ln>
           <a:extLst>
             <a:ext uri="{C572A759-6A51-4108-AA02-DFA0A04FC94B}">
-              <ma14:wrappingTextBoxFlag xmlns:ma14="http://schemas.microsoft.com/office/mac/drawingml/2011/main" xmlns:a14="http://schemas.microsoft.com/office/drawing/2010/main" xmlns:m="http://schemas.openxmlformats.org/officeDocument/2006/math" xmlns="" val="1"/>
+              <ma14:wrappingTextBoxFlag xmlns="" xmlns:m="http://schemas.openxmlformats.org/officeDocument/2006/math" xmlns:a14="http://schemas.microsoft.com/office/drawing/2010/main" xmlns:ma14="http://schemas.microsoft.com/office/mac/drawingml/2011/main" val="1"/>
             </a:ext>
           </a:extLst>
         </p:spPr>
@@ -24370,7 +24400,7 @@
           </a:ln>
           <a:extLst>
             <a:ext uri="{C572A759-6A51-4108-AA02-DFA0A04FC94B}">
-              <ma14:wrappingTextBoxFlag xmlns:ma14="http://schemas.microsoft.com/office/mac/drawingml/2011/main" xmlns:a14="http://schemas.microsoft.com/office/drawing/2010/main" xmlns:m="http://schemas.openxmlformats.org/officeDocument/2006/math" xmlns="" val="1"/>
+              <ma14:wrappingTextBoxFlag xmlns="" xmlns:m="http://schemas.openxmlformats.org/officeDocument/2006/math" xmlns:a14="http://schemas.microsoft.com/office/drawing/2010/main" xmlns:ma14="http://schemas.microsoft.com/office/mac/drawingml/2011/main" val="1"/>
             </a:ext>
           </a:extLst>
         </p:spPr>
@@ -24428,7 +24458,7 @@
           </a:effectLst>
           <a:extLst>
             <a:ext uri="{C572A759-6A51-4108-AA02-DFA0A04FC94B}">
-              <ma14:wrappingTextBoxFlag xmlns:ma14="http://schemas.microsoft.com/office/mac/drawingml/2011/main" xmlns:a14="http://schemas.microsoft.com/office/drawing/2010/main" xmlns:m="http://schemas.openxmlformats.org/officeDocument/2006/math" xmlns="" val="1"/>
+              <ma14:wrappingTextBoxFlag xmlns="" xmlns:m="http://schemas.openxmlformats.org/officeDocument/2006/math" xmlns:a14="http://schemas.microsoft.com/office/drawing/2010/main" xmlns:ma14="http://schemas.microsoft.com/office/mac/drawingml/2011/main" val="1"/>
             </a:ext>
           </a:extLst>
         </p:spPr>
@@ -24464,11 +24494,11 @@
   <p:clrMapOvr>
     <a:masterClrMapping/>
   </p:clrMapOvr>
-  <mc:AlternateContent xmlns:mc="http://schemas.openxmlformats.org/markup-compatibility/2006">
-    <mc:Choice xmlns:p14="http://schemas.microsoft.com/office/powerpoint/2010/main" Requires="p14">
+  <mc:AlternateContent xmlns:mc="http://schemas.openxmlformats.org/markup-compatibility/2006" xmlns:p14="http://schemas.microsoft.com/office/powerpoint/2010/main">
+    <mc:Choice Requires="p14">
       <p:transition p14:dur="0"/>
     </mc:Choice>
-    <mc:Fallback>
+    <mc:Fallback xmlns="">
       <p:transition/>
     </mc:Fallback>
   </mc:AlternateContent>
@@ -24870,11 +24900,11 @@
   <p:clrMapOvr>
     <a:masterClrMapping/>
   </p:clrMapOvr>
-  <mc:AlternateContent xmlns:mc="http://schemas.openxmlformats.org/markup-compatibility/2006">
-    <mc:Choice xmlns:p14="http://schemas.microsoft.com/office/powerpoint/2010/main" Requires="p14">
+  <mc:AlternateContent xmlns:mc="http://schemas.openxmlformats.org/markup-compatibility/2006" xmlns:p14="http://schemas.microsoft.com/office/powerpoint/2010/main">
+    <mc:Choice Requires="p14">
       <p:transition p14:dur="0"/>
     </mc:Choice>
-    <mc:Fallback>
+    <mc:Fallback xmlns="">
       <p:transition/>
     </mc:Fallback>
   </mc:AlternateContent>
@@ -25146,7 +25176,7 @@
           </a:ln>
           <a:extLst>
             <a:ext uri="{C572A759-6A51-4108-AA02-DFA0A04FC94B}">
-              <ma14:wrappingTextBoxFlag xmlns:ma14="http://schemas.microsoft.com/office/mac/drawingml/2011/main" xmlns:a14="http://schemas.microsoft.com/office/drawing/2010/main" xmlns:m="http://schemas.openxmlformats.org/officeDocument/2006/math" xmlns="" val="1"/>
+              <ma14:wrappingTextBoxFlag xmlns="" xmlns:m="http://schemas.openxmlformats.org/officeDocument/2006/math" xmlns:a14="http://schemas.microsoft.com/office/drawing/2010/main" xmlns:ma14="http://schemas.microsoft.com/office/mac/drawingml/2011/main" val="1"/>
             </a:ext>
           </a:extLst>
         </p:spPr>
@@ -25194,7 +25224,7 @@
           </a:ln>
           <a:extLst>
             <a:ext uri="{C572A759-6A51-4108-AA02-DFA0A04FC94B}">
-              <ma14:wrappingTextBoxFlag xmlns:ma14="http://schemas.microsoft.com/office/mac/drawingml/2011/main" xmlns:a14="http://schemas.microsoft.com/office/drawing/2010/main" xmlns:m="http://schemas.openxmlformats.org/officeDocument/2006/math" xmlns="" val="1"/>
+              <ma14:wrappingTextBoxFlag xmlns="" xmlns:m="http://schemas.openxmlformats.org/officeDocument/2006/math" xmlns:a14="http://schemas.microsoft.com/office/drawing/2010/main" xmlns:ma14="http://schemas.microsoft.com/office/mac/drawingml/2011/main" val="1"/>
             </a:ext>
           </a:extLst>
         </p:spPr>
@@ -25242,7 +25272,7 @@
           </a:ln>
           <a:extLst>
             <a:ext uri="{C572A759-6A51-4108-AA02-DFA0A04FC94B}">
-              <ma14:wrappingTextBoxFlag xmlns:ma14="http://schemas.microsoft.com/office/mac/drawingml/2011/main" xmlns:a14="http://schemas.microsoft.com/office/drawing/2010/main" xmlns:m="http://schemas.openxmlformats.org/officeDocument/2006/math" xmlns="" val="1"/>
+              <ma14:wrappingTextBoxFlag xmlns="" xmlns:m="http://schemas.openxmlformats.org/officeDocument/2006/math" xmlns:a14="http://schemas.microsoft.com/office/drawing/2010/main" xmlns:ma14="http://schemas.microsoft.com/office/mac/drawingml/2011/main" val="1"/>
             </a:ext>
           </a:extLst>
         </p:spPr>
@@ -25290,7 +25320,7 @@
           </a:ln>
           <a:extLst>
             <a:ext uri="{C572A759-6A51-4108-AA02-DFA0A04FC94B}">
-              <ma14:wrappingTextBoxFlag xmlns:ma14="http://schemas.microsoft.com/office/mac/drawingml/2011/main" xmlns:a14="http://schemas.microsoft.com/office/drawing/2010/main" xmlns:m="http://schemas.openxmlformats.org/officeDocument/2006/math" xmlns="" val="1"/>
+              <ma14:wrappingTextBoxFlag xmlns="" xmlns:m="http://schemas.openxmlformats.org/officeDocument/2006/math" xmlns:a14="http://schemas.microsoft.com/office/drawing/2010/main" xmlns:ma14="http://schemas.microsoft.com/office/mac/drawingml/2011/main" val="1"/>
             </a:ext>
           </a:extLst>
         </p:spPr>
@@ -25338,7 +25368,7 @@
           </a:ln>
           <a:extLst>
             <a:ext uri="{C572A759-6A51-4108-AA02-DFA0A04FC94B}">
-              <ma14:wrappingTextBoxFlag xmlns:ma14="http://schemas.microsoft.com/office/mac/drawingml/2011/main" xmlns:a14="http://schemas.microsoft.com/office/drawing/2010/main" xmlns:m="http://schemas.openxmlformats.org/officeDocument/2006/math" xmlns="" val="1"/>
+              <ma14:wrappingTextBoxFlag xmlns="" xmlns:m="http://schemas.openxmlformats.org/officeDocument/2006/math" xmlns:a14="http://schemas.microsoft.com/office/drawing/2010/main" xmlns:ma14="http://schemas.microsoft.com/office/mac/drawingml/2011/main" val="1"/>
             </a:ext>
           </a:extLst>
         </p:spPr>
@@ -25468,7 +25498,7 @@
           </a:ln>
           <a:extLst>
             <a:ext uri="{C572A759-6A51-4108-AA02-DFA0A04FC94B}">
-              <ma14:wrappingTextBoxFlag xmlns:ma14="http://schemas.microsoft.com/office/mac/drawingml/2011/main" xmlns:a14="http://schemas.microsoft.com/office/drawing/2010/main" xmlns:m="http://schemas.openxmlformats.org/officeDocument/2006/math" xmlns="" val="1"/>
+              <ma14:wrappingTextBoxFlag xmlns="" xmlns:m="http://schemas.openxmlformats.org/officeDocument/2006/math" xmlns:a14="http://schemas.microsoft.com/office/drawing/2010/main" xmlns:ma14="http://schemas.microsoft.com/office/mac/drawingml/2011/main" val="1"/>
             </a:ext>
           </a:extLst>
         </p:spPr>
@@ -25598,7 +25628,7 @@
           </a:ln>
           <a:extLst>
             <a:ext uri="{C572A759-6A51-4108-AA02-DFA0A04FC94B}">
-              <ma14:wrappingTextBoxFlag xmlns:ma14="http://schemas.microsoft.com/office/mac/drawingml/2011/main" xmlns:a14="http://schemas.microsoft.com/office/drawing/2010/main" xmlns:m="http://schemas.openxmlformats.org/officeDocument/2006/math" xmlns="" val="1"/>
+              <ma14:wrappingTextBoxFlag xmlns="" xmlns:m="http://schemas.openxmlformats.org/officeDocument/2006/math" xmlns:a14="http://schemas.microsoft.com/office/drawing/2010/main" xmlns:ma14="http://schemas.microsoft.com/office/mac/drawingml/2011/main" val="1"/>
             </a:ext>
           </a:extLst>
         </p:spPr>
@@ -25728,7 +25758,7 @@
           </a:ln>
           <a:extLst>
             <a:ext uri="{C572A759-6A51-4108-AA02-DFA0A04FC94B}">
-              <ma14:wrappingTextBoxFlag xmlns:ma14="http://schemas.microsoft.com/office/mac/drawingml/2011/main" xmlns:a14="http://schemas.microsoft.com/office/drawing/2010/main" xmlns:m="http://schemas.openxmlformats.org/officeDocument/2006/math" xmlns="" val="1"/>
+              <ma14:wrappingTextBoxFlag xmlns="" xmlns:m="http://schemas.openxmlformats.org/officeDocument/2006/math" xmlns:a14="http://schemas.microsoft.com/office/drawing/2010/main" xmlns:ma14="http://schemas.microsoft.com/office/mac/drawingml/2011/main" val="1"/>
             </a:ext>
           </a:extLst>
         </p:spPr>
@@ -25776,7 +25806,7 @@
           </a:ln>
           <a:extLst>
             <a:ext uri="{C572A759-6A51-4108-AA02-DFA0A04FC94B}">
-              <ma14:wrappingTextBoxFlag xmlns:ma14="http://schemas.microsoft.com/office/mac/drawingml/2011/main" xmlns:a14="http://schemas.microsoft.com/office/drawing/2010/main" xmlns:m="http://schemas.openxmlformats.org/officeDocument/2006/math" xmlns="" val="1"/>
+              <ma14:wrappingTextBoxFlag xmlns="" xmlns:m="http://schemas.openxmlformats.org/officeDocument/2006/math" xmlns:a14="http://schemas.microsoft.com/office/drawing/2010/main" xmlns:ma14="http://schemas.microsoft.com/office/mac/drawingml/2011/main" val="1"/>
             </a:ext>
           </a:extLst>
         </p:spPr>
@@ -25865,7 +25895,7 @@
           </a:ln>
           <a:extLst>
             <a:ext uri="{C572A759-6A51-4108-AA02-DFA0A04FC94B}">
-              <ma14:wrappingTextBoxFlag xmlns:ma14="http://schemas.microsoft.com/office/mac/drawingml/2011/main" xmlns:a14="http://schemas.microsoft.com/office/drawing/2010/main" xmlns:m="http://schemas.openxmlformats.org/officeDocument/2006/math" xmlns="" val="1"/>
+              <ma14:wrappingTextBoxFlag xmlns="" xmlns:m="http://schemas.openxmlformats.org/officeDocument/2006/math" xmlns:a14="http://schemas.microsoft.com/office/drawing/2010/main" xmlns:ma14="http://schemas.microsoft.com/office/mac/drawingml/2011/main" val="1"/>
             </a:ext>
           </a:extLst>
         </p:spPr>
@@ -25940,11 +25970,11 @@
   <p:clrMapOvr>
     <a:masterClrMapping/>
   </p:clrMapOvr>
-  <mc:AlternateContent xmlns:mc="http://schemas.openxmlformats.org/markup-compatibility/2006">
-    <mc:Choice xmlns:p14="http://schemas.microsoft.com/office/powerpoint/2010/main" Requires="p14">
+  <mc:AlternateContent xmlns:mc="http://schemas.openxmlformats.org/markup-compatibility/2006" xmlns:p14="http://schemas.microsoft.com/office/powerpoint/2010/main">
+    <mc:Choice Requires="p14">
       <p:transition p14:dur="0"/>
     </mc:Choice>
-    <mc:Fallback>
+    <mc:Fallback xmlns="">
       <p:transition/>
     </mc:Fallback>
   </mc:AlternateContent>
@@ -26091,7 +26121,7 @@
           </a:ln>
           <a:extLst>
             <a:ext uri="{C572A759-6A51-4108-AA02-DFA0A04FC94B}">
-              <ma14:wrappingTextBoxFlag xmlns:ma14="http://schemas.microsoft.com/office/mac/drawingml/2011/main" xmlns:a14="http://schemas.microsoft.com/office/drawing/2010/main" xmlns:m="http://schemas.openxmlformats.org/officeDocument/2006/math" xmlns="" val="1"/>
+              <ma14:wrappingTextBoxFlag xmlns="" xmlns:m="http://schemas.openxmlformats.org/officeDocument/2006/math" xmlns:a14="http://schemas.microsoft.com/office/drawing/2010/main" xmlns:ma14="http://schemas.microsoft.com/office/mac/drawingml/2011/main" val="1"/>
             </a:ext>
           </a:extLst>
         </p:spPr>
@@ -26139,7 +26169,7 @@
           </a:ln>
           <a:extLst>
             <a:ext uri="{C572A759-6A51-4108-AA02-DFA0A04FC94B}">
-              <ma14:wrappingTextBoxFlag xmlns:ma14="http://schemas.microsoft.com/office/mac/drawingml/2011/main" xmlns:a14="http://schemas.microsoft.com/office/drawing/2010/main" xmlns:m="http://schemas.openxmlformats.org/officeDocument/2006/math" xmlns="" val="1"/>
+              <ma14:wrappingTextBoxFlag xmlns="" xmlns:m="http://schemas.openxmlformats.org/officeDocument/2006/math" xmlns:a14="http://schemas.microsoft.com/office/drawing/2010/main" xmlns:ma14="http://schemas.microsoft.com/office/mac/drawingml/2011/main" val="1"/>
             </a:ext>
           </a:extLst>
         </p:spPr>
@@ -26187,7 +26217,7 @@
           </a:ln>
           <a:extLst>
             <a:ext uri="{C572A759-6A51-4108-AA02-DFA0A04FC94B}">
-              <ma14:wrappingTextBoxFlag xmlns:ma14="http://schemas.microsoft.com/office/mac/drawingml/2011/main" xmlns:a14="http://schemas.microsoft.com/office/drawing/2010/main" xmlns:m="http://schemas.openxmlformats.org/officeDocument/2006/math" xmlns="" val="1"/>
+              <ma14:wrappingTextBoxFlag xmlns="" xmlns:m="http://schemas.openxmlformats.org/officeDocument/2006/math" xmlns:a14="http://schemas.microsoft.com/office/drawing/2010/main" xmlns:ma14="http://schemas.microsoft.com/office/mac/drawingml/2011/main" val="1"/>
             </a:ext>
           </a:extLst>
         </p:spPr>
@@ -26235,7 +26265,7 @@
           </a:ln>
           <a:extLst>
             <a:ext uri="{C572A759-6A51-4108-AA02-DFA0A04FC94B}">
-              <ma14:wrappingTextBoxFlag xmlns:ma14="http://schemas.microsoft.com/office/mac/drawingml/2011/main" xmlns:a14="http://schemas.microsoft.com/office/drawing/2010/main" xmlns:m="http://schemas.openxmlformats.org/officeDocument/2006/math" xmlns="" val="1"/>
+              <ma14:wrappingTextBoxFlag xmlns="" xmlns:m="http://schemas.openxmlformats.org/officeDocument/2006/math" xmlns:a14="http://schemas.microsoft.com/office/drawing/2010/main" xmlns:ma14="http://schemas.microsoft.com/office/mac/drawingml/2011/main" val="1"/>
             </a:ext>
           </a:extLst>
         </p:spPr>
@@ -26283,7 +26313,7 @@
           </a:ln>
           <a:extLst>
             <a:ext uri="{C572A759-6A51-4108-AA02-DFA0A04FC94B}">
-              <ma14:wrappingTextBoxFlag xmlns:ma14="http://schemas.microsoft.com/office/mac/drawingml/2011/main" xmlns:a14="http://schemas.microsoft.com/office/drawing/2010/main" xmlns:m="http://schemas.openxmlformats.org/officeDocument/2006/math" xmlns="" val="1"/>
+              <ma14:wrappingTextBoxFlag xmlns="" xmlns:m="http://schemas.openxmlformats.org/officeDocument/2006/math" xmlns:a14="http://schemas.microsoft.com/office/drawing/2010/main" xmlns:ma14="http://schemas.microsoft.com/office/mac/drawingml/2011/main" val="1"/>
             </a:ext>
           </a:extLst>
         </p:spPr>
@@ -26413,7 +26443,7 @@
           </a:ln>
           <a:extLst>
             <a:ext uri="{C572A759-6A51-4108-AA02-DFA0A04FC94B}">
-              <ma14:wrappingTextBoxFlag xmlns:ma14="http://schemas.microsoft.com/office/mac/drawingml/2011/main" xmlns:a14="http://schemas.microsoft.com/office/drawing/2010/main" xmlns:m="http://schemas.openxmlformats.org/officeDocument/2006/math" xmlns="" val="1"/>
+              <ma14:wrappingTextBoxFlag xmlns="" xmlns:m="http://schemas.openxmlformats.org/officeDocument/2006/math" xmlns:a14="http://schemas.microsoft.com/office/drawing/2010/main" xmlns:ma14="http://schemas.microsoft.com/office/mac/drawingml/2011/main" val="1"/>
             </a:ext>
           </a:extLst>
         </p:spPr>
@@ -26543,7 +26573,7 @@
           </a:ln>
           <a:extLst>
             <a:ext uri="{C572A759-6A51-4108-AA02-DFA0A04FC94B}">
-              <ma14:wrappingTextBoxFlag xmlns:ma14="http://schemas.microsoft.com/office/mac/drawingml/2011/main" xmlns:a14="http://schemas.microsoft.com/office/drawing/2010/main" xmlns:m="http://schemas.openxmlformats.org/officeDocument/2006/math" xmlns="" val="1"/>
+              <ma14:wrappingTextBoxFlag xmlns="" xmlns:m="http://schemas.openxmlformats.org/officeDocument/2006/math" xmlns:a14="http://schemas.microsoft.com/office/drawing/2010/main" xmlns:ma14="http://schemas.microsoft.com/office/mac/drawingml/2011/main" val="1"/>
             </a:ext>
           </a:extLst>
         </p:spPr>
@@ -26673,7 +26703,7 @@
           </a:ln>
           <a:extLst>
             <a:ext uri="{C572A759-6A51-4108-AA02-DFA0A04FC94B}">
-              <ma14:wrappingTextBoxFlag xmlns:ma14="http://schemas.microsoft.com/office/mac/drawingml/2011/main" xmlns:a14="http://schemas.microsoft.com/office/drawing/2010/main" xmlns:m="http://schemas.openxmlformats.org/officeDocument/2006/math" xmlns="" val="1"/>
+              <ma14:wrappingTextBoxFlag xmlns="" xmlns:m="http://schemas.openxmlformats.org/officeDocument/2006/math" xmlns:a14="http://schemas.microsoft.com/office/drawing/2010/main" xmlns:ma14="http://schemas.microsoft.com/office/mac/drawingml/2011/main" val="1"/>
             </a:ext>
           </a:extLst>
         </p:spPr>
@@ -26721,7 +26751,7 @@
           </a:ln>
           <a:extLst>
             <a:ext uri="{C572A759-6A51-4108-AA02-DFA0A04FC94B}">
-              <ma14:wrappingTextBoxFlag xmlns:ma14="http://schemas.microsoft.com/office/mac/drawingml/2011/main" xmlns:a14="http://schemas.microsoft.com/office/drawing/2010/main" xmlns:m="http://schemas.openxmlformats.org/officeDocument/2006/math" xmlns="" val="1"/>
+              <ma14:wrappingTextBoxFlag xmlns="" xmlns:m="http://schemas.openxmlformats.org/officeDocument/2006/math" xmlns:a14="http://schemas.microsoft.com/office/drawing/2010/main" xmlns:ma14="http://schemas.microsoft.com/office/mac/drawingml/2011/main" val="1"/>
             </a:ext>
           </a:extLst>
         </p:spPr>
@@ -26810,7 +26840,7 @@
           </a:ln>
           <a:extLst>
             <a:ext uri="{C572A759-6A51-4108-AA02-DFA0A04FC94B}">
-              <ma14:wrappingTextBoxFlag xmlns:ma14="http://schemas.microsoft.com/office/mac/drawingml/2011/main" xmlns:a14="http://schemas.microsoft.com/office/drawing/2010/main" xmlns:m="http://schemas.openxmlformats.org/officeDocument/2006/math" xmlns="" val="1"/>
+              <ma14:wrappingTextBoxFlag xmlns="" xmlns:m="http://schemas.openxmlformats.org/officeDocument/2006/math" xmlns:a14="http://schemas.microsoft.com/office/drawing/2010/main" xmlns:ma14="http://schemas.microsoft.com/office/mac/drawingml/2011/main" val="1"/>
             </a:ext>
           </a:extLst>
         </p:spPr>
@@ -26899,7 +26929,7 @@
           </a:ln>
           <a:extLst>
             <a:ext uri="{C572A759-6A51-4108-AA02-DFA0A04FC94B}">
-              <ma14:wrappingTextBoxFlag xmlns:ma14="http://schemas.microsoft.com/office/mac/drawingml/2011/main" xmlns:a14="http://schemas.microsoft.com/office/drawing/2010/main" xmlns:m="http://schemas.openxmlformats.org/officeDocument/2006/math" xmlns="" val="1"/>
+              <ma14:wrappingTextBoxFlag xmlns="" xmlns:m="http://schemas.openxmlformats.org/officeDocument/2006/math" xmlns:a14="http://schemas.microsoft.com/office/drawing/2010/main" xmlns:ma14="http://schemas.microsoft.com/office/mac/drawingml/2011/main" val="1"/>
             </a:ext>
           </a:extLst>
         </p:spPr>
@@ -26936,11 +26966,11 @@
   <p:clrMapOvr>
     <a:masterClrMapping/>
   </p:clrMapOvr>
-  <mc:AlternateContent xmlns:mc="http://schemas.openxmlformats.org/markup-compatibility/2006">
-    <mc:Choice xmlns:p14="http://schemas.microsoft.com/office/powerpoint/2010/main" Requires="p14">
+  <mc:AlternateContent xmlns:mc="http://schemas.openxmlformats.org/markup-compatibility/2006" xmlns:p14="http://schemas.microsoft.com/office/powerpoint/2010/main">
+    <mc:Choice Requires="p14">
       <p:transition p14:dur="0"/>
     </mc:Choice>
-    <mc:Fallback>
+    <mc:Fallback xmlns="">
       <p:transition/>
     </mc:Fallback>
   </mc:AlternateContent>
@@ -26992,7 +27022,7 @@
           </a:ln>
           <a:extLst>
             <a:ext uri="{C572A759-6A51-4108-AA02-DFA0A04FC94B}">
-              <ma14:wrappingTextBoxFlag xmlns="" xmlns:m="http://schemas.openxmlformats.org/officeDocument/2006/math" xmlns:a14="http://schemas.microsoft.com/office/drawing/2010/main" xmlns:ma14="http://schemas.microsoft.com/office/mac/drawingml/2011/main" val="1"/>
+              <ma14:wrappingTextBoxFlag xmlns:ma14="http://schemas.microsoft.com/office/mac/drawingml/2011/main" xmlns:a14="http://schemas.microsoft.com/office/drawing/2010/main" xmlns:m="http://schemas.openxmlformats.org/officeDocument/2006/math" xmlns="" val="1"/>
             </a:ext>
           </a:extLst>
         </p:spPr>
@@ -27386,7 +27416,7 @@
           </a:prstGeom>
           <a:extLst>
             <a:ext uri="{C572A759-6A51-4108-AA02-DFA0A04FC94B}">
-              <ma14:wrappingTextBoxFlag xmlns:ma14="http://schemas.microsoft.com/office/mac/drawingml/2011/main" xmlns:a14="http://schemas.microsoft.com/office/drawing/2010/main" xmlns:m="http://schemas.openxmlformats.org/officeDocument/2006/math" xmlns="" val="1"/>
+              <ma14:wrappingTextBoxFlag xmlns="" xmlns:m="http://schemas.openxmlformats.org/officeDocument/2006/math" xmlns:a14="http://schemas.microsoft.com/office/drawing/2010/main" xmlns:ma14="http://schemas.microsoft.com/office/mac/drawingml/2011/main" val="1"/>
             </a:ext>
           </a:extLst>
         </p:spPr>
@@ -27443,7 +27473,7 @@
             </a:ln>
             <a:extLst>
               <a:ext uri="{C572A759-6A51-4108-AA02-DFA0A04FC94B}">
-                <ma14:wrappingTextBoxFlag xmlns:ma14="http://schemas.microsoft.com/office/mac/drawingml/2011/main" xmlns:a14="http://schemas.microsoft.com/office/drawing/2010/main" xmlns:m="http://schemas.openxmlformats.org/officeDocument/2006/math" xmlns="" val="1"/>
+                <ma14:wrappingTextBoxFlag xmlns="" xmlns:m="http://schemas.openxmlformats.org/officeDocument/2006/math" xmlns:a14="http://schemas.microsoft.com/office/drawing/2010/main" xmlns:ma14="http://schemas.microsoft.com/office/mac/drawingml/2011/main" val="1"/>
               </a:ext>
             </a:extLst>
           </p:spPr>
@@ -27707,7 +27737,7 @@
             <a:effectLst/>
             <a:extLst>
               <a:ext uri="{C572A759-6A51-4108-AA02-DFA0A04FC94B}">
-                <ma14:wrappingTextBoxFlag xmlns:ma14="http://schemas.microsoft.com/office/mac/drawingml/2011/main" xmlns:a14="http://schemas.microsoft.com/office/drawing/2010/main" xmlns:m="http://schemas.openxmlformats.org/officeDocument/2006/math" xmlns="" val="1"/>
+                <ma14:wrappingTextBoxFlag xmlns="" xmlns:m="http://schemas.openxmlformats.org/officeDocument/2006/math" xmlns:a14="http://schemas.microsoft.com/office/drawing/2010/main" xmlns:ma14="http://schemas.microsoft.com/office/mac/drawingml/2011/main" val="1"/>
               </a:ext>
             </a:extLst>
           </p:spPr>
@@ -27847,7 +27877,7 @@
             <a:effectLst/>
             <a:extLst>
               <a:ext uri="{C572A759-6A51-4108-AA02-DFA0A04FC94B}">
-                <ma14:wrappingTextBoxFlag xmlns:ma14="http://schemas.microsoft.com/office/mac/drawingml/2011/main" xmlns:a14="http://schemas.microsoft.com/office/drawing/2010/main" xmlns:m="http://schemas.openxmlformats.org/officeDocument/2006/math" xmlns="" val="1"/>
+                <ma14:wrappingTextBoxFlag xmlns="" xmlns:m="http://schemas.openxmlformats.org/officeDocument/2006/math" xmlns:a14="http://schemas.microsoft.com/office/drawing/2010/main" xmlns:ma14="http://schemas.microsoft.com/office/mac/drawingml/2011/main" val="1"/>
               </a:ext>
             </a:extLst>
           </p:spPr>
@@ -27919,7 +27949,7 @@
             </a:ln>
             <a:extLst>
               <a:ext uri="{C572A759-6A51-4108-AA02-DFA0A04FC94B}">
-                <ma14:wrappingTextBoxFlag xmlns:ma14="http://schemas.microsoft.com/office/mac/drawingml/2011/main" xmlns:a14="http://schemas.microsoft.com/office/drawing/2010/main" xmlns:m="http://schemas.openxmlformats.org/officeDocument/2006/math" xmlns="" val="1"/>
+                <ma14:wrappingTextBoxFlag xmlns="" xmlns:m="http://schemas.openxmlformats.org/officeDocument/2006/math" xmlns:a14="http://schemas.microsoft.com/office/drawing/2010/main" xmlns:ma14="http://schemas.microsoft.com/office/mac/drawingml/2011/main" val="1"/>
               </a:ext>
             </a:extLst>
           </p:spPr>
@@ -28120,11 +28150,11 @@
   <p:clrMapOvr>
     <a:masterClrMapping/>
   </p:clrMapOvr>
-  <mc:AlternateContent xmlns:mc="http://schemas.openxmlformats.org/markup-compatibility/2006">
-    <mc:Choice xmlns:p14="http://schemas.microsoft.com/office/powerpoint/2010/main" Requires="p14">
+  <mc:AlternateContent xmlns:mc="http://schemas.openxmlformats.org/markup-compatibility/2006" xmlns:p14="http://schemas.microsoft.com/office/powerpoint/2010/main">
+    <mc:Choice Requires="p14">
       <p:transition p14:dur="0"/>
     </mc:Choice>
-    <mc:Fallback>
+    <mc:Fallback xmlns="">
       <p:transition/>
     </mc:Fallback>
   </mc:AlternateContent>
@@ -28461,7 +28491,7 @@
           </a:prstGeom>
           <a:extLst>
             <a:ext uri="{C572A759-6A51-4108-AA02-DFA0A04FC94B}">
-              <ma14:wrappingTextBoxFlag xmlns:ma14="http://schemas.microsoft.com/office/mac/drawingml/2011/main" xmlns:a14="http://schemas.microsoft.com/office/drawing/2010/main" xmlns:m="http://schemas.openxmlformats.org/officeDocument/2006/math" xmlns="" val="1"/>
+              <ma14:wrappingTextBoxFlag xmlns="" xmlns:m="http://schemas.openxmlformats.org/officeDocument/2006/math" xmlns:a14="http://schemas.microsoft.com/office/drawing/2010/main" xmlns:ma14="http://schemas.microsoft.com/office/mac/drawingml/2011/main" val="1"/>
             </a:ext>
           </a:extLst>
         </p:spPr>
@@ -28831,7 +28861,7 @@
             </a:effectLst>
             <a:extLst>
               <a:ext uri="{C572A759-6A51-4108-AA02-DFA0A04FC94B}">
-                <ma14:wrappingTextBoxFlag xmlns:ma14="http://schemas.microsoft.com/office/mac/drawingml/2011/main" xmlns:a14="http://schemas.microsoft.com/office/drawing/2010/main" xmlns:m="http://schemas.openxmlformats.org/officeDocument/2006/math" xmlns="" val="1"/>
+                <ma14:wrappingTextBoxFlag xmlns="" xmlns:m="http://schemas.openxmlformats.org/officeDocument/2006/math" xmlns:a14="http://schemas.microsoft.com/office/drawing/2010/main" xmlns:ma14="http://schemas.microsoft.com/office/mac/drawingml/2011/main" val="1"/>
               </a:ext>
             </a:extLst>
           </p:spPr>
@@ -28901,7 +28931,7 @@
             </a:effectLst>
             <a:extLst>
               <a:ext uri="{C572A759-6A51-4108-AA02-DFA0A04FC94B}">
-                <ma14:wrappingTextBoxFlag xmlns:ma14="http://schemas.microsoft.com/office/mac/drawingml/2011/main" xmlns:a14="http://schemas.microsoft.com/office/drawing/2010/main" xmlns:m="http://schemas.openxmlformats.org/officeDocument/2006/math" xmlns="" val="1"/>
+                <ma14:wrappingTextBoxFlag xmlns="" xmlns:m="http://schemas.openxmlformats.org/officeDocument/2006/math" xmlns:a14="http://schemas.microsoft.com/office/drawing/2010/main" xmlns:ma14="http://schemas.microsoft.com/office/mac/drawingml/2011/main" val="1"/>
               </a:ext>
             </a:extLst>
           </p:spPr>
@@ -28969,7 +28999,7 @@
             </a:effectLst>
             <a:extLst>
               <a:ext uri="{C572A759-6A51-4108-AA02-DFA0A04FC94B}">
-                <ma14:wrappingTextBoxFlag xmlns:ma14="http://schemas.microsoft.com/office/mac/drawingml/2011/main" xmlns:a14="http://schemas.microsoft.com/office/drawing/2010/main" xmlns:m="http://schemas.openxmlformats.org/officeDocument/2006/math" xmlns="" val="1"/>
+                <ma14:wrappingTextBoxFlag xmlns="" xmlns:m="http://schemas.openxmlformats.org/officeDocument/2006/math" xmlns:a14="http://schemas.microsoft.com/office/drawing/2010/main" xmlns:ma14="http://schemas.microsoft.com/office/mac/drawingml/2011/main" val="1"/>
               </a:ext>
             </a:extLst>
           </p:spPr>
@@ -29057,7 +29087,7 @@
               </a:effectLst>
               <a:extLst>
                 <a:ext uri="{C572A759-6A51-4108-AA02-DFA0A04FC94B}">
-                  <ma14:wrappingTextBoxFlag xmlns:ma14="http://schemas.microsoft.com/office/mac/drawingml/2011/main" xmlns:a14="http://schemas.microsoft.com/office/drawing/2010/main" xmlns:m="http://schemas.openxmlformats.org/officeDocument/2006/math" xmlns="" val="1"/>
+                  <ma14:wrappingTextBoxFlag xmlns="" xmlns:m="http://schemas.openxmlformats.org/officeDocument/2006/math" xmlns:a14="http://schemas.microsoft.com/office/drawing/2010/main" xmlns:ma14="http://schemas.microsoft.com/office/mac/drawingml/2011/main" val="1"/>
                 </a:ext>
               </a:extLst>
             </p:spPr>
@@ -29235,7 +29265,7 @@
                 <a:effectLst/>
                 <a:extLst>
                   <a:ext uri="{C572A759-6A51-4108-AA02-DFA0A04FC94B}">
-                    <ma14:wrappingTextBoxFlag xmlns:ma14="http://schemas.microsoft.com/office/mac/drawingml/2011/main" xmlns:a14="http://schemas.microsoft.com/office/drawing/2010/main" xmlns:m="http://schemas.openxmlformats.org/officeDocument/2006/math" xmlns="" val="1"/>
+                    <ma14:wrappingTextBoxFlag xmlns="" xmlns:m="http://schemas.openxmlformats.org/officeDocument/2006/math" xmlns:a14="http://schemas.microsoft.com/office/drawing/2010/main" xmlns:ma14="http://schemas.microsoft.com/office/mac/drawingml/2011/main" val="1"/>
                   </a:ext>
                 </a:extLst>
               </p:spPr>
@@ -29435,7 +29465,7 @@
                 <a:effectLst/>
                 <a:extLst>
                   <a:ext uri="{C572A759-6A51-4108-AA02-DFA0A04FC94B}">
-                    <ma14:wrappingTextBoxFlag xmlns:ma14="http://schemas.microsoft.com/office/mac/drawingml/2011/main" xmlns:a14="http://schemas.microsoft.com/office/drawing/2010/main" xmlns:m="http://schemas.openxmlformats.org/officeDocument/2006/math" xmlns="" val="1"/>
+                    <ma14:wrappingTextBoxFlag xmlns="" xmlns:m="http://schemas.openxmlformats.org/officeDocument/2006/math" xmlns:a14="http://schemas.microsoft.com/office/drawing/2010/main" xmlns:ma14="http://schemas.microsoft.com/office/mac/drawingml/2011/main" val="1"/>
                   </a:ext>
                 </a:extLst>
               </p:spPr>
@@ -29525,7 +29555,7 @@
               </a:effectLst>
               <a:extLst>
                 <a:ext uri="{C572A759-6A51-4108-AA02-DFA0A04FC94B}">
-                  <ma14:wrappingTextBoxFlag xmlns:ma14="http://schemas.microsoft.com/office/mac/drawingml/2011/main" xmlns:a14="http://schemas.microsoft.com/office/drawing/2010/main" xmlns:m="http://schemas.openxmlformats.org/officeDocument/2006/math" xmlns="" val="1"/>
+                  <ma14:wrappingTextBoxFlag xmlns="" xmlns:m="http://schemas.openxmlformats.org/officeDocument/2006/math" xmlns:a14="http://schemas.microsoft.com/office/drawing/2010/main" xmlns:ma14="http://schemas.microsoft.com/office/mac/drawingml/2011/main" val="1"/>
                 </a:ext>
               </a:extLst>
             </p:spPr>
@@ -29703,7 +29733,7 @@
                 <a:effectLst/>
                 <a:extLst>
                   <a:ext uri="{C572A759-6A51-4108-AA02-DFA0A04FC94B}">
-                    <ma14:wrappingTextBoxFlag xmlns:ma14="http://schemas.microsoft.com/office/mac/drawingml/2011/main" xmlns:a14="http://schemas.microsoft.com/office/drawing/2010/main" xmlns:m="http://schemas.openxmlformats.org/officeDocument/2006/math" xmlns="" val="1"/>
+                    <ma14:wrappingTextBoxFlag xmlns="" xmlns:m="http://schemas.openxmlformats.org/officeDocument/2006/math" xmlns:a14="http://schemas.microsoft.com/office/drawing/2010/main" xmlns:ma14="http://schemas.microsoft.com/office/mac/drawingml/2011/main" val="1"/>
                   </a:ext>
                 </a:extLst>
               </p:spPr>
@@ -29793,7 +29823,7 @@
               </a:effectLst>
               <a:extLst>
                 <a:ext uri="{C572A759-6A51-4108-AA02-DFA0A04FC94B}">
-                  <ma14:wrappingTextBoxFlag xmlns:ma14="http://schemas.microsoft.com/office/mac/drawingml/2011/main" xmlns:a14="http://schemas.microsoft.com/office/drawing/2010/main" xmlns:m="http://schemas.openxmlformats.org/officeDocument/2006/math" xmlns="" val="1"/>
+                  <ma14:wrappingTextBoxFlag xmlns="" xmlns:m="http://schemas.openxmlformats.org/officeDocument/2006/math" xmlns:a14="http://schemas.microsoft.com/office/drawing/2010/main" xmlns:ma14="http://schemas.microsoft.com/office/mac/drawingml/2011/main" val="1"/>
                 </a:ext>
               </a:extLst>
             </p:spPr>
@@ -29971,7 +30001,7 @@
                 <a:effectLst/>
                 <a:extLst>
                   <a:ext uri="{C572A759-6A51-4108-AA02-DFA0A04FC94B}">
-                    <ma14:wrappingTextBoxFlag xmlns:ma14="http://schemas.microsoft.com/office/mac/drawingml/2011/main" xmlns:a14="http://schemas.microsoft.com/office/drawing/2010/main" xmlns:m="http://schemas.openxmlformats.org/officeDocument/2006/math" xmlns="" val="1"/>
+                    <ma14:wrappingTextBoxFlag xmlns="" xmlns:m="http://schemas.openxmlformats.org/officeDocument/2006/math" xmlns:a14="http://schemas.microsoft.com/office/drawing/2010/main" xmlns:ma14="http://schemas.microsoft.com/office/mac/drawingml/2011/main" val="1"/>
                   </a:ext>
                 </a:extLst>
               </p:spPr>
@@ -30042,7 +30072,7 @@
           </a:effectLst>
           <a:extLst>
             <a:ext uri="{C572A759-6A51-4108-AA02-DFA0A04FC94B}">
-              <ma14:wrappingTextBoxFlag xmlns:ma14="http://schemas.microsoft.com/office/mac/drawingml/2011/main" xmlns:a14="http://schemas.microsoft.com/office/drawing/2010/main" xmlns:m="http://schemas.openxmlformats.org/officeDocument/2006/math" xmlns="" val="1"/>
+              <ma14:wrappingTextBoxFlag xmlns="" xmlns:m="http://schemas.openxmlformats.org/officeDocument/2006/math" xmlns:a14="http://schemas.microsoft.com/office/drawing/2010/main" xmlns:ma14="http://schemas.microsoft.com/office/mac/drawingml/2011/main" val="1"/>
             </a:ext>
           </a:extLst>
         </p:spPr>
@@ -30254,7 +30284,7 @@
           </a:prstGeom>
           <a:extLst>
             <a:ext uri="{C572A759-6A51-4108-AA02-DFA0A04FC94B}">
-              <ma14:wrappingTextBoxFlag xmlns:ma14="http://schemas.microsoft.com/office/mac/drawingml/2011/main" xmlns:a14="http://schemas.microsoft.com/office/drawing/2010/main" xmlns:m="http://schemas.openxmlformats.org/officeDocument/2006/math" xmlns="" val="1"/>
+              <ma14:wrappingTextBoxFlag xmlns="" xmlns:m="http://schemas.openxmlformats.org/officeDocument/2006/math" xmlns:a14="http://schemas.microsoft.com/office/drawing/2010/main" xmlns:ma14="http://schemas.microsoft.com/office/mac/drawingml/2011/main" val="1"/>
             </a:ext>
           </a:extLst>
         </p:spPr>
@@ -30519,11 +30549,11 @@
   <p:clrMapOvr>
     <a:masterClrMapping/>
   </p:clrMapOvr>
-  <mc:AlternateContent xmlns:mc="http://schemas.openxmlformats.org/markup-compatibility/2006">
-    <mc:Choice xmlns:p14="http://schemas.microsoft.com/office/powerpoint/2010/main" Requires="p14">
+  <mc:AlternateContent xmlns:mc="http://schemas.openxmlformats.org/markup-compatibility/2006" xmlns:p14="http://schemas.microsoft.com/office/powerpoint/2010/main">
+    <mc:Choice Requires="p14">
       <p:transition p14:dur="0"/>
     </mc:Choice>
-    <mc:Fallback>
+    <mc:Fallback xmlns="">
       <p:transition/>
     </mc:Fallback>
   </mc:AlternateContent>
@@ -30670,11 +30700,11 @@
   <p:clrMapOvr>
     <a:masterClrMapping/>
   </p:clrMapOvr>
-  <mc:AlternateContent xmlns:mc="http://schemas.openxmlformats.org/markup-compatibility/2006">
-    <mc:Choice xmlns:p14="http://schemas.microsoft.com/office/powerpoint/2010/main" Requires="p14">
+  <mc:AlternateContent xmlns:mc="http://schemas.openxmlformats.org/markup-compatibility/2006" xmlns:p14="http://schemas.microsoft.com/office/powerpoint/2010/main">
+    <mc:Choice Requires="p14">
       <p:transition p14:dur="0"/>
     </mc:Choice>
-    <mc:Fallback>
+    <mc:Fallback xmlns="">
       <p:transition/>
     </mc:Fallback>
   </mc:AlternateContent>
@@ -30739,7 +30769,7 @@
           </a:prstGeom>
           <a:extLst>
             <a:ext uri="{C572A759-6A51-4108-AA02-DFA0A04FC94B}">
-              <ma14:wrappingTextBoxFlag xmlns:ma14="http://schemas.microsoft.com/office/mac/drawingml/2011/main" xmlns:a14="http://schemas.microsoft.com/office/drawing/2010/main" xmlns:m="http://schemas.openxmlformats.org/officeDocument/2006/math" xmlns="" val="1"/>
+              <ma14:wrappingTextBoxFlag xmlns="" xmlns:m="http://schemas.openxmlformats.org/officeDocument/2006/math" xmlns:a14="http://schemas.microsoft.com/office/drawing/2010/main" xmlns:ma14="http://schemas.microsoft.com/office/mac/drawingml/2011/main" val="1"/>
             </a:ext>
           </a:extLst>
         </p:spPr>
@@ -30774,7 +30804,7 @@
           </a:ln>
           <a:extLst>
             <a:ext uri="{C572A759-6A51-4108-AA02-DFA0A04FC94B}">
-              <ma14:wrappingTextBoxFlag xmlns:ma14="http://schemas.microsoft.com/office/mac/drawingml/2011/main" xmlns:a14="http://schemas.microsoft.com/office/drawing/2010/main" xmlns:m="http://schemas.openxmlformats.org/officeDocument/2006/math" xmlns="" val="1"/>
+              <ma14:wrappingTextBoxFlag xmlns="" xmlns:m="http://schemas.openxmlformats.org/officeDocument/2006/math" xmlns:a14="http://schemas.microsoft.com/office/drawing/2010/main" xmlns:ma14="http://schemas.microsoft.com/office/mac/drawingml/2011/main" val="1"/>
             </a:ext>
           </a:extLst>
         </p:spPr>
@@ -31440,7 +31470,7 @@
           </a:ln>
           <a:extLst>
             <a:ext uri="{C572A759-6A51-4108-AA02-DFA0A04FC94B}">
-              <ma14:wrappingTextBoxFlag xmlns:ma14="http://schemas.microsoft.com/office/mac/drawingml/2011/main" xmlns:a14="http://schemas.microsoft.com/office/drawing/2010/main" xmlns:m="http://schemas.openxmlformats.org/officeDocument/2006/math" xmlns="" val="1"/>
+              <ma14:wrappingTextBoxFlag xmlns="" xmlns:m="http://schemas.openxmlformats.org/officeDocument/2006/math" xmlns:a14="http://schemas.microsoft.com/office/drawing/2010/main" xmlns:ma14="http://schemas.microsoft.com/office/mac/drawingml/2011/main" val="1"/>
             </a:ext>
           </a:extLst>
         </p:spPr>
@@ -31488,7 +31518,7 @@
           </a:ln>
           <a:extLst>
             <a:ext uri="{C572A759-6A51-4108-AA02-DFA0A04FC94B}">
-              <ma14:wrappingTextBoxFlag xmlns:ma14="http://schemas.microsoft.com/office/mac/drawingml/2011/main" xmlns:a14="http://schemas.microsoft.com/office/drawing/2010/main" xmlns:m="http://schemas.openxmlformats.org/officeDocument/2006/math" xmlns="" val="1"/>
+              <ma14:wrappingTextBoxFlag xmlns="" xmlns:m="http://schemas.openxmlformats.org/officeDocument/2006/math" xmlns:a14="http://schemas.microsoft.com/office/drawing/2010/main" xmlns:ma14="http://schemas.microsoft.com/office/mac/drawingml/2011/main" val="1"/>
             </a:ext>
           </a:extLst>
         </p:spPr>
@@ -31566,11 +31596,11 @@
   <p:clrMapOvr>
     <a:masterClrMapping/>
   </p:clrMapOvr>
-  <mc:AlternateContent xmlns:mc="http://schemas.openxmlformats.org/markup-compatibility/2006">
-    <mc:Choice xmlns:p14="http://schemas.microsoft.com/office/powerpoint/2010/main" Requires="p14">
+  <mc:AlternateContent xmlns:mc="http://schemas.openxmlformats.org/markup-compatibility/2006" xmlns:p14="http://schemas.microsoft.com/office/powerpoint/2010/main">
+    <mc:Choice Requires="p14">
       <p:transition p14:dur="0"/>
     </mc:Choice>
-    <mc:Fallback>
+    <mc:Fallback xmlns="">
       <p:transition/>
     </mc:Fallback>
   </mc:AlternateContent>
@@ -32188,7 +32218,7 @@
           </a:prstGeom>
           <a:extLst>
             <a:ext uri="{C572A759-6A51-4108-AA02-DFA0A04FC94B}">
-              <ma14:wrappingTextBoxFlag xmlns:ma14="http://schemas.microsoft.com/office/mac/drawingml/2011/main" xmlns:a14="http://schemas.microsoft.com/office/drawing/2010/main" xmlns:m="http://schemas.openxmlformats.org/officeDocument/2006/math" xmlns="" val="1"/>
+              <ma14:wrappingTextBoxFlag xmlns="" xmlns:m="http://schemas.openxmlformats.org/officeDocument/2006/math" xmlns:a14="http://schemas.microsoft.com/office/drawing/2010/main" xmlns:ma14="http://schemas.microsoft.com/office/mac/drawingml/2011/main" val="1"/>
             </a:ext>
           </a:extLst>
         </p:spPr>
@@ -32223,7 +32253,7 @@
           </a:ln>
           <a:extLst>
             <a:ext uri="{C572A759-6A51-4108-AA02-DFA0A04FC94B}">
-              <ma14:wrappingTextBoxFlag xmlns:ma14="http://schemas.microsoft.com/office/mac/drawingml/2011/main" xmlns:a14="http://schemas.microsoft.com/office/drawing/2010/main" xmlns:m="http://schemas.openxmlformats.org/officeDocument/2006/math" xmlns="" val="1"/>
+              <ma14:wrappingTextBoxFlag xmlns="" xmlns:m="http://schemas.openxmlformats.org/officeDocument/2006/math" xmlns:a14="http://schemas.microsoft.com/office/drawing/2010/main" xmlns:ma14="http://schemas.microsoft.com/office/mac/drawingml/2011/main" val="1"/>
             </a:ext>
           </a:extLst>
         </p:spPr>
@@ -32271,7 +32301,7 @@
           </a:ln>
           <a:extLst>
             <a:ext uri="{C572A759-6A51-4108-AA02-DFA0A04FC94B}">
-              <ma14:wrappingTextBoxFlag xmlns:ma14="http://schemas.microsoft.com/office/mac/drawingml/2011/main" xmlns:a14="http://schemas.microsoft.com/office/drawing/2010/main" xmlns:m="http://schemas.openxmlformats.org/officeDocument/2006/math" xmlns="" val="1"/>
+              <ma14:wrappingTextBoxFlag xmlns="" xmlns:m="http://schemas.openxmlformats.org/officeDocument/2006/math" xmlns:a14="http://schemas.microsoft.com/office/drawing/2010/main" xmlns:ma14="http://schemas.microsoft.com/office/mac/drawingml/2011/main" val="1"/>
             </a:ext>
           </a:extLst>
         </p:spPr>
@@ -32319,7 +32349,7 @@
           </a:ln>
           <a:extLst>
             <a:ext uri="{C572A759-6A51-4108-AA02-DFA0A04FC94B}">
-              <ma14:wrappingTextBoxFlag xmlns:ma14="http://schemas.microsoft.com/office/mac/drawingml/2011/main" xmlns:a14="http://schemas.microsoft.com/office/drawing/2010/main" xmlns:m="http://schemas.openxmlformats.org/officeDocument/2006/math" xmlns="" val="1"/>
+              <ma14:wrappingTextBoxFlag xmlns="" xmlns:m="http://schemas.openxmlformats.org/officeDocument/2006/math" xmlns:a14="http://schemas.microsoft.com/office/drawing/2010/main" xmlns:ma14="http://schemas.microsoft.com/office/mac/drawingml/2011/main" val="1"/>
             </a:ext>
           </a:extLst>
         </p:spPr>
@@ -32411,7 +32441,7 @@
           </a:ln>
           <a:extLst>
             <a:ext uri="{C572A759-6A51-4108-AA02-DFA0A04FC94B}">
-              <ma14:wrappingTextBoxFlag xmlns:ma14="http://schemas.microsoft.com/office/mac/drawingml/2011/main" xmlns:a14="http://schemas.microsoft.com/office/drawing/2010/main" xmlns:m="http://schemas.openxmlformats.org/officeDocument/2006/math" xmlns="" val="1"/>
+              <ma14:wrappingTextBoxFlag xmlns="" xmlns:m="http://schemas.openxmlformats.org/officeDocument/2006/math" xmlns:a14="http://schemas.microsoft.com/office/drawing/2010/main" xmlns:ma14="http://schemas.microsoft.com/office/mac/drawingml/2011/main" val="1"/>
             </a:ext>
           </a:extLst>
         </p:spPr>
@@ -32521,11 +32551,11 @@
   <p:clrMapOvr>
     <a:masterClrMapping/>
   </p:clrMapOvr>
-  <mc:AlternateContent xmlns:mc="http://schemas.openxmlformats.org/markup-compatibility/2006">
-    <mc:Choice xmlns:p14="http://schemas.microsoft.com/office/powerpoint/2010/main" Requires="p14">
+  <mc:AlternateContent xmlns:mc="http://schemas.openxmlformats.org/markup-compatibility/2006" xmlns:p14="http://schemas.microsoft.com/office/powerpoint/2010/main">
+    <mc:Choice Requires="p14">
       <p:transition p14:dur="0"/>
     </mc:Choice>
-    <mc:Fallback>
+    <mc:Fallback xmlns="">
       <p:transition/>
     </mc:Fallback>
   </mc:AlternateContent>
@@ -32828,7 +32858,7 @@
           </a:prstGeom>
           <a:extLst>
             <a:ext uri="{C572A759-6A51-4108-AA02-DFA0A04FC94B}">
-              <ma14:wrappingTextBoxFlag xmlns:ma14="http://schemas.microsoft.com/office/mac/drawingml/2011/main" xmlns:a14="http://schemas.microsoft.com/office/drawing/2010/main" xmlns:m="http://schemas.openxmlformats.org/officeDocument/2006/math" xmlns="" val="1"/>
+              <ma14:wrappingTextBoxFlag xmlns="" xmlns:m="http://schemas.openxmlformats.org/officeDocument/2006/math" xmlns:a14="http://schemas.microsoft.com/office/drawing/2010/main" xmlns:ma14="http://schemas.microsoft.com/office/mac/drawingml/2011/main" val="1"/>
             </a:ext>
           </a:extLst>
         </p:spPr>
@@ -32985,7 +33015,7 @@
               <a:effectLst/>
               <a:extLst>
                 <a:ext uri="{C572A759-6A51-4108-AA02-DFA0A04FC94B}">
-                  <ma14:wrappingTextBoxFlag xmlns:ma14="http://schemas.microsoft.com/office/mac/drawingml/2011/main" xmlns:a14="http://schemas.microsoft.com/office/drawing/2010/main" xmlns:m="http://schemas.openxmlformats.org/officeDocument/2006/math" xmlns="" val="1"/>
+                  <ma14:wrappingTextBoxFlag xmlns="" xmlns:m="http://schemas.openxmlformats.org/officeDocument/2006/math" xmlns:a14="http://schemas.microsoft.com/office/drawing/2010/main" xmlns:ma14="http://schemas.microsoft.com/office/mac/drawingml/2011/main" val="1"/>
                 </a:ext>
               </a:extLst>
             </p:spPr>
@@ -33036,7 +33066,7 @@
               <a:effectLst/>
               <a:extLst>
                 <a:ext uri="{C572A759-6A51-4108-AA02-DFA0A04FC94B}">
-                  <ma14:wrappingTextBoxFlag xmlns:ma14="http://schemas.microsoft.com/office/mac/drawingml/2011/main" xmlns:a14="http://schemas.microsoft.com/office/drawing/2010/main" xmlns:m="http://schemas.openxmlformats.org/officeDocument/2006/math" xmlns="" val="1"/>
+                  <ma14:wrappingTextBoxFlag xmlns="" xmlns:m="http://schemas.openxmlformats.org/officeDocument/2006/math" xmlns:a14="http://schemas.microsoft.com/office/drawing/2010/main" xmlns:ma14="http://schemas.microsoft.com/office/mac/drawingml/2011/main" val="1"/>
                 </a:ext>
               </a:extLst>
             </p:spPr>
@@ -33088,7 +33118,7 @@
             <a:effectLst/>
             <a:extLst>
               <a:ext uri="{C572A759-6A51-4108-AA02-DFA0A04FC94B}">
-                <ma14:wrappingTextBoxFlag xmlns:ma14="http://schemas.microsoft.com/office/mac/drawingml/2011/main" xmlns:a14="http://schemas.microsoft.com/office/drawing/2010/main" xmlns:m="http://schemas.openxmlformats.org/officeDocument/2006/math" xmlns="" val="1"/>
+                <ma14:wrappingTextBoxFlag xmlns="" xmlns:m="http://schemas.openxmlformats.org/officeDocument/2006/math" xmlns:a14="http://schemas.microsoft.com/office/drawing/2010/main" xmlns:ma14="http://schemas.microsoft.com/office/mac/drawingml/2011/main" val="1"/>
               </a:ext>
             </a:extLst>
           </p:spPr>
@@ -33266,7 +33296,7 @@
               <a:effectLst/>
               <a:extLst>
                 <a:ext uri="{C572A759-6A51-4108-AA02-DFA0A04FC94B}">
-                  <ma14:wrappingTextBoxFlag xmlns:ma14="http://schemas.microsoft.com/office/mac/drawingml/2011/main" xmlns:a14="http://schemas.microsoft.com/office/drawing/2010/main" xmlns:m="http://schemas.openxmlformats.org/officeDocument/2006/math" xmlns="" val="1"/>
+                  <ma14:wrappingTextBoxFlag xmlns="" xmlns:m="http://schemas.openxmlformats.org/officeDocument/2006/math" xmlns:a14="http://schemas.microsoft.com/office/drawing/2010/main" xmlns:ma14="http://schemas.microsoft.com/office/mac/drawingml/2011/main" val="1"/>
                 </a:ext>
               </a:extLst>
             </p:spPr>
@@ -33317,7 +33347,7 @@
               <a:effectLst/>
               <a:extLst>
                 <a:ext uri="{C572A759-6A51-4108-AA02-DFA0A04FC94B}">
-                  <ma14:wrappingTextBoxFlag xmlns:ma14="http://schemas.microsoft.com/office/mac/drawingml/2011/main" xmlns:a14="http://schemas.microsoft.com/office/drawing/2010/main" xmlns:m="http://schemas.openxmlformats.org/officeDocument/2006/math" xmlns="" val="1"/>
+                  <ma14:wrappingTextBoxFlag xmlns="" xmlns:m="http://schemas.openxmlformats.org/officeDocument/2006/math" xmlns:a14="http://schemas.microsoft.com/office/drawing/2010/main" xmlns:ma14="http://schemas.microsoft.com/office/mac/drawingml/2011/main" val="1"/>
                 </a:ext>
               </a:extLst>
             </p:spPr>
@@ -33403,7 +33433,7 @@
             <a:effectLst/>
             <a:extLst>
               <a:ext uri="{C572A759-6A51-4108-AA02-DFA0A04FC94B}">
-                <ma14:wrappingTextBoxFlag xmlns:ma14="http://schemas.microsoft.com/office/mac/drawingml/2011/main" xmlns:a14="http://schemas.microsoft.com/office/drawing/2010/main" xmlns:m="http://schemas.openxmlformats.org/officeDocument/2006/math" xmlns="" val="1"/>
+                <ma14:wrappingTextBoxFlag xmlns="" xmlns:m="http://schemas.openxmlformats.org/officeDocument/2006/math" xmlns:a14="http://schemas.microsoft.com/office/drawing/2010/main" xmlns:ma14="http://schemas.microsoft.com/office/mac/drawingml/2011/main" val="1"/>
               </a:ext>
             </a:extLst>
           </p:spPr>
@@ -33494,7 +33524,7 @@
           </a:ln>
           <a:extLst>
             <a:ext uri="{C572A759-6A51-4108-AA02-DFA0A04FC94B}">
-              <ma14:wrappingTextBoxFlag xmlns:ma14="http://schemas.microsoft.com/office/mac/drawingml/2011/main" xmlns:a14="http://schemas.microsoft.com/office/drawing/2010/main" xmlns:m="http://schemas.openxmlformats.org/officeDocument/2006/math" xmlns="" val="1"/>
+              <ma14:wrappingTextBoxFlag xmlns="" xmlns:m="http://schemas.openxmlformats.org/officeDocument/2006/math" xmlns:a14="http://schemas.microsoft.com/office/drawing/2010/main" xmlns:ma14="http://schemas.microsoft.com/office/mac/drawingml/2011/main" val="1"/>
             </a:ext>
           </a:extLst>
         </p:spPr>
@@ -33544,11 +33574,11 @@
   <p:clrMapOvr>
     <a:masterClrMapping/>
   </p:clrMapOvr>
-  <mc:AlternateContent xmlns:mc="http://schemas.openxmlformats.org/markup-compatibility/2006">
-    <mc:Choice xmlns:p14="http://schemas.microsoft.com/office/powerpoint/2010/main" Requires="p14">
+  <mc:AlternateContent xmlns:mc="http://schemas.openxmlformats.org/markup-compatibility/2006" xmlns:p14="http://schemas.microsoft.com/office/powerpoint/2010/main">
+    <mc:Choice Requires="p14">
       <p:transition p14:dur="0"/>
     </mc:Choice>
-    <mc:Fallback>
+    <mc:Fallback xmlns="">
       <p:transition/>
     </mc:Fallback>
   </mc:AlternateContent>
@@ -34034,7 +34064,7 @@
               </a:effectLst>
               <a:extLst>
                 <a:ext uri="{C572A759-6A51-4108-AA02-DFA0A04FC94B}">
-                  <ma14:wrappingTextBoxFlag xmlns:ma14="http://schemas.microsoft.com/office/mac/drawingml/2011/main" xmlns:a14="http://schemas.microsoft.com/office/drawing/2010/main" xmlns:m="http://schemas.openxmlformats.org/officeDocument/2006/math" xmlns="" val="1"/>
+                  <ma14:wrappingTextBoxFlag xmlns="" xmlns:m="http://schemas.openxmlformats.org/officeDocument/2006/math" xmlns:a14="http://schemas.microsoft.com/office/drawing/2010/main" xmlns:ma14="http://schemas.microsoft.com/office/mac/drawingml/2011/main" val="1"/>
                 </a:ext>
               </a:extLst>
             </p:spPr>
@@ -34164,7 +34194,7 @@
               </a:effectLst>
               <a:extLst>
                 <a:ext uri="{C572A759-6A51-4108-AA02-DFA0A04FC94B}">
-                  <ma14:wrappingTextBoxFlag xmlns:ma14="http://schemas.microsoft.com/office/mac/drawingml/2011/main" xmlns:a14="http://schemas.microsoft.com/office/drawing/2010/main" xmlns:m="http://schemas.openxmlformats.org/officeDocument/2006/math" xmlns="" val="1"/>
+                  <ma14:wrappingTextBoxFlag xmlns="" xmlns:m="http://schemas.openxmlformats.org/officeDocument/2006/math" xmlns:a14="http://schemas.microsoft.com/office/drawing/2010/main" xmlns:ma14="http://schemas.microsoft.com/office/mac/drawingml/2011/main" val="1"/>
                 </a:ext>
               </a:extLst>
             </p:spPr>
@@ -34294,7 +34324,7 @@
               </a:effectLst>
               <a:extLst>
                 <a:ext uri="{C572A759-6A51-4108-AA02-DFA0A04FC94B}">
-                  <ma14:wrappingTextBoxFlag xmlns:ma14="http://schemas.microsoft.com/office/mac/drawingml/2011/main" xmlns:a14="http://schemas.microsoft.com/office/drawing/2010/main" xmlns:m="http://schemas.openxmlformats.org/officeDocument/2006/math" xmlns="" val="1"/>
+                  <ma14:wrappingTextBoxFlag xmlns="" xmlns:m="http://schemas.openxmlformats.org/officeDocument/2006/math" xmlns:a14="http://schemas.microsoft.com/office/drawing/2010/main" xmlns:ma14="http://schemas.microsoft.com/office/mac/drawingml/2011/main" val="1"/>
                 </a:ext>
               </a:extLst>
             </p:spPr>
@@ -34424,7 +34454,7 @@
               </a:effectLst>
               <a:extLst>
                 <a:ext uri="{C572A759-6A51-4108-AA02-DFA0A04FC94B}">
-                  <ma14:wrappingTextBoxFlag xmlns:ma14="http://schemas.microsoft.com/office/mac/drawingml/2011/main" xmlns:a14="http://schemas.microsoft.com/office/drawing/2010/main" xmlns:m="http://schemas.openxmlformats.org/officeDocument/2006/math" xmlns="" val="1"/>
+                  <ma14:wrappingTextBoxFlag xmlns="" xmlns:m="http://schemas.openxmlformats.org/officeDocument/2006/math" xmlns:a14="http://schemas.microsoft.com/office/drawing/2010/main" xmlns:ma14="http://schemas.microsoft.com/office/mac/drawingml/2011/main" val="1"/>
                 </a:ext>
               </a:extLst>
             </p:spPr>
@@ -34476,7 +34506,7 @@
             <a:effectLst/>
             <a:extLst>
               <a:ext uri="{C572A759-6A51-4108-AA02-DFA0A04FC94B}">
-                <ma14:wrappingTextBoxFlag xmlns:ma14="http://schemas.microsoft.com/office/mac/drawingml/2011/main" xmlns:a14="http://schemas.microsoft.com/office/drawing/2010/main" xmlns:m="http://schemas.openxmlformats.org/officeDocument/2006/math" xmlns="" val="1"/>
+                <ma14:wrappingTextBoxFlag xmlns="" xmlns:m="http://schemas.openxmlformats.org/officeDocument/2006/math" xmlns:a14="http://schemas.microsoft.com/office/drawing/2010/main" xmlns:ma14="http://schemas.microsoft.com/office/mac/drawingml/2011/main" val="1"/>
               </a:ext>
             </a:extLst>
           </p:spPr>
@@ -34527,7 +34557,7 @@
             <a:effectLst/>
             <a:extLst>
               <a:ext uri="{C572A759-6A51-4108-AA02-DFA0A04FC94B}">
-                <ma14:wrappingTextBoxFlag xmlns:ma14="http://schemas.microsoft.com/office/mac/drawingml/2011/main" xmlns:a14="http://schemas.microsoft.com/office/drawing/2010/main" xmlns:m="http://schemas.openxmlformats.org/officeDocument/2006/math" xmlns="" val="1"/>
+                <ma14:wrappingTextBoxFlag xmlns="" xmlns:m="http://schemas.openxmlformats.org/officeDocument/2006/math" xmlns:a14="http://schemas.microsoft.com/office/drawing/2010/main" xmlns:ma14="http://schemas.microsoft.com/office/mac/drawingml/2011/main" val="1"/>
               </a:ext>
             </a:extLst>
           </p:spPr>
@@ -34657,7 +34687,7 @@
             </a:effectLst>
             <a:extLst>
               <a:ext uri="{C572A759-6A51-4108-AA02-DFA0A04FC94B}">
-                <ma14:wrappingTextBoxFlag xmlns:ma14="http://schemas.microsoft.com/office/mac/drawingml/2011/main" xmlns:a14="http://schemas.microsoft.com/office/drawing/2010/main" xmlns:m="http://schemas.openxmlformats.org/officeDocument/2006/math" xmlns="" val="1"/>
+                <ma14:wrappingTextBoxFlag xmlns="" xmlns:m="http://schemas.openxmlformats.org/officeDocument/2006/math" xmlns:a14="http://schemas.microsoft.com/office/drawing/2010/main" xmlns:ma14="http://schemas.microsoft.com/office/mac/drawingml/2011/main" val="1"/>
               </a:ext>
             </a:extLst>
           </p:spPr>
@@ -34803,7 +34833,7 @@
             </a:effectLst>
             <a:extLst>
               <a:ext uri="{C572A759-6A51-4108-AA02-DFA0A04FC94B}">
-                <ma14:wrappingTextBoxFlag xmlns:ma14="http://schemas.microsoft.com/office/mac/drawingml/2011/main" xmlns:a14="http://schemas.microsoft.com/office/drawing/2010/main" xmlns:m="http://schemas.openxmlformats.org/officeDocument/2006/math" xmlns="" val="1"/>
+                <ma14:wrappingTextBoxFlag xmlns="" xmlns:m="http://schemas.openxmlformats.org/officeDocument/2006/math" xmlns:a14="http://schemas.microsoft.com/office/drawing/2010/main" xmlns:ma14="http://schemas.microsoft.com/office/mac/drawingml/2011/main" val="1"/>
               </a:ext>
             </a:extLst>
           </p:spPr>
@@ -34946,7 +34976,7 @@
               <a:effectLst/>
               <a:extLst>
                 <a:ext uri="{C572A759-6A51-4108-AA02-DFA0A04FC94B}">
-                  <ma14:wrappingTextBoxFlag xmlns:ma14="http://schemas.microsoft.com/office/mac/drawingml/2011/main" xmlns:a14="http://schemas.microsoft.com/office/drawing/2010/main" xmlns:m="http://schemas.openxmlformats.org/officeDocument/2006/math" xmlns="" val="1"/>
+                  <ma14:wrappingTextBoxFlag xmlns="" xmlns:m="http://schemas.openxmlformats.org/officeDocument/2006/math" xmlns:a14="http://schemas.microsoft.com/office/drawing/2010/main" xmlns:ma14="http://schemas.microsoft.com/office/mac/drawingml/2011/main" val="1"/>
                 </a:ext>
               </a:extLst>
             </p:spPr>
@@ -35099,7 +35129,7 @@
           </a:effectLst>
           <a:extLst>
             <a:ext uri="{C572A759-6A51-4108-AA02-DFA0A04FC94B}">
-              <ma14:wrappingTextBoxFlag xmlns:ma14="http://schemas.microsoft.com/office/mac/drawingml/2011/main" xmlns:a14="http://schemas.microsoft.com/office/drawing/2010/main" xmlns:m="http://schemas.openxmlformats.org/officeDocument/2006/math" xmlns="" val="1"/>
+              <ma14:wrappingTextBoxFlag xmlns="" xmlns:m="http://schemas.openxmlformats.org/officeDocument/2006/math" xmlns:a14="http://schemas.microsoft.com/office/drawing/2010/main" xmlns:ma14="http://schemas.microsoft.com/office/mac/drawingml/2011/main" val="1"/>
             </a:ext>
           </a:extLst>
         </p:spPr>
@@ -35131,11 +35161,11 @@
   <p:clrMapOvr>
     <a:masterClrMapping/>
   </p:clrMapOvr>
-  <mc:AlternateContent xmlns:mc="http://schemas.openxmlformats.org/markup-compatibility/2006">
-    <mc:Choice xmlns:p14="http://schemas.microsoft.com/office/powerpoint/2010/main" Requires="p14">
+  <mc:AlternateContent xmlns:mc="http://schemas.openxmlformats.org/markup-compatibility/2006" xmlns:p14="http://schemas.microsoft.com/office/powerpoint/2010/main">
+    <mc:Choice Requires="p14">
       <p:transition p14:dur="0"/>
     </mc:Choice>
-    <mc:Fallback>
+    <mc:Fallback xmlns="">
       <p:transition/>
     </mc:Fallback>
   </mc:AlternateContent>

</xml_diff>